<commit_message>
added 2 simple heading slides for Ken's microsoft talk.
</commit_message>
<xml_diff>
--- a/TOG_Paper/video_stuff/movie_slides_4_3.pptx
+++ b/TOG_Paper/video_stuff/movie_slides_4_3.pptx
@@ -12,6 +12,8 @@
     <p:sldId id="260" r:id="rId6"/>
     <p:sldId id="261" r:id="rId7"/>
     <p:sldId id="262" r:id="rId8"/>
+    <p:sldId id="263" r:id="rId9"/>
+    <p:sldId id="264" r:id="rId10"/>
   </p:sldIdLst>
   <p:sldSz cx="9144000" cy="6858000" type="screen4x3"/>
   <p:notesSz cx="6858000" cy="9144000"/>
@@ -295,7 +297,7 @@
             <a:fld id="{1D8BD707-D9CF-40AE-B4C6-C98DA3205C09}" type="datetimeFigureOut">
               <a:rPr lang="en-US" smtClean="0"/>
               <a:pPr/>
-              <a:t>7/14/2013</a:t>
+              <a:t>7/15/13</a:t>
             </a:fld>
             <a:endParaRPr lang="en-US"/>
           </a:p>
@@ -462,7 +464,7 @@
             <a:fld id="{1D8BD707-D9CF-40AE-B4C6-C98DA3205C09}" type="datetimeFigureOut">
               <a:rPr lang="en-US" smtClean="0"/>
               <a:pPr/>
-              <a:t>7/14/2013</a:t>
+              <a:t>7/15/13</a:t>
             </a:fld>
             <a:endParaRPr lang="en-US"/>
           </a:p>
@@ -639,7 +641,7 @@
             <a:fld id="{1D8BD707-D9CF-40AE-B4C6-C98DA3205C09}" type="datetimeFigureOut">
               <a:rPr lang="en-US" smtClean="0"/>
               <a:pPr/>
-              <a:t>7/14/2013</a:t>
+              <a:t>7/15/13</a:t>
             </a:fld>
             <a:endParaRPr lang="en-US"/>
           </a:p>
@@ -806,7 +808,7 @@
             <a:fld id="{1D8BD707-D9CF-40AE-B4C6-C98DA3205C09}" type="datetimeFigureOut">
               <a:rPr lang="en-US" smtClean="0"/>
               <a:pPr/>
-              <a:t>7/14/2013</a:t>
+              <a:t>7/15/13</a:t>
             </a:fld>
             <a:endParaRPr lang="en-US"/>
           </a:p>
@@ -1049,7 +1051,7 @@
             <a:fld id="{1D8BD707-D9CF-40AE-B4C6-C98DA3205C09}" type="datetimeFigureOut">
               <a:rPr lang="en-US" smtClean="0"/>
               <a:pPr/>
-              <a:t>7/14/2013</a:t>
+              <a:t>7/15/13</a:t>
             </a:fld>
             <a:endParaRPr lang="en-US"/>
           </a:p>
@@ -1334,7 +1336,7 @@
             <a:fld id="{1D8BD707-D9CF-40AE-B4C6-C98DA3205C09}" type="datetimeFigureOut">
               <a:rPr lang="en-US" smtClean="0"/>
               <a:pPr/>
-              <a:t>7/14/2013</a:t>
+              <a:t>7/15/13</a:t>
             </a:fld>
             <a:endParaRPr lang="en-US"/>
           </a:p>
@@ -1753,7 +1755,7 @@
             <a:fld id="{1D8BD707-D9CF-40AE-B4C6-C98DA3205C09}" type="datetimeFigureOut">
               <a:rPr lang="en-US" smtClean="0"/>
               <a:pPr/>
-              <a:t>7/14/2013</a:t>
+              <a:t>7/15/13</a:t>
             </a:fld>
             <a:endParaRPr lang="en-US"/>
           </a:p>
@@ -1868,7 +1870,7 @@
             <a:fld id="{1D8BD707-D9CF-40AE-B4C6-C98DA3205C09}" type="datetimeFigureOut">
               <a:rPr lang="en-US" smtClean="0"/>
               <a:pPr/>
-              <a:t>7/14/2013</a:t>
+              <a:t>7/15/13</a:t>
             </a:fld>
             <a:endParaRPr lang="en-US"/>
           </a:p>
@@ -1960,7 +1962,7 @@
             <a:fld id="{1D8BD707-D9CF-40AE-B4C6-C98DA3205C09}" type="datetimeFigureOut">
               <a:rPr lang="en-US" smtClean="0"/>
               <a:pPr/>
-              <a:t>7/14/2013</a:t>
+              <a:t>7/15/13</a:t>
             </a:fld>
             <a:endParaRPr lang="en-US"/>
           </a:p>
@@ -2234,7 +2236,7 @@
             <a:fld id="{1D8BD707-D9CF-40AE-B4C6-C98DA3205C09}" type="datetimeFigureOut">
               <a:rPr lang="en-US" smtClean="0"/>
               <a:pPr/>
-              <a:t>7/14/2013</a:t>
+              <a:t>7/15/13</a:t>
             </a:fld>
             <a:endParaRPr lang="en-US"/>
           </a:p>
@@ -2484,7 +2486,7 @@
             <a:fld id="{1D8BD707-D9CF-40AE-B4C6-C98DA3205C09}" type="datetimeFigureOut">
               <a:rPr lang="en-US" smtClean="0"/>
               <a:pPr/>
-              <a:t>7/14/2013</a:t>
+              <a:t>7/15/13</a:t>
             </a:fld>
             <a:endParaRPr lang="en-US"/>
           </a:p>
@@ -2694,7 +2696,7 @@
             <a:fld id="{1D8BD707-D9CF-40AE-B4C6-C98DA3205C09}" type="datetimeFigureOut">
               <a:rPr lang="en-US" smtClean="0"/>
               <a:pPr/>
-              <a:t>7/14/2013</a:t>
+              <a:t>7/15/13</a:t>
             </a:fld>
             <a:endParaRPr lang="en-US"/>
           </a:p>
@@ -3576,14 +3578,14 @@
             <a:noFill/>
           </a:ln>
           <a:extLst>
-            <a:ext uri="{909E8E84-426E-40DD-AFC4-6F175D3DCCD1}">
+            <a:ext uri="{909E8E84-426E-40dd-AFC4-6F175D3DCCD1}">
               <a14:hiddenFill xmlns:a14="http://schemas.microsoft.com/office/drawing/2010/main">
                 <a:solidFill>
                   <a:schemeClr val="accent1"/>
                 </a:solidFill>
               </a14:hiddenFill>
             </a:ext>
-            <a:ext uri="{91240B29-F687-4F45-9708-019B960494DF}">
+            <a:ext uri="{91240B29-F687-4f45-9708-019B960494DF}">
               <a14:hiddenLine xmlns:a14="http://schemas.microsoft.com/office/drawing/2010/main" w="9525">
                 <a:solidFill>
                   <a:schemeClr val="tx1"/>
@@ -3661,7 +3663,7 @@
             <a:tailEnd/>
           </a:ln>
           <a:extLst>
-            <a:ext uri="{909E8E84-426E-40DD-AFC4-6F175D3DCCD1}">
+            <a:ext uri="{909E8E84-426E-40dd-AFC4-6F175D3DCCD1}">
               <a14:hiddenFill xmlns:a14="http://schemas.microsoft.com/office/drawing/2010/main">
                 <a:solidFill>
                   <a:schemeClr val="accent1"/>
@@ -4110,14 +4112,14 @@
           </a:ln>
           <a:effectLst/>
           <a:extLst>
-            <a:ext uri="{909E8E84-426E-40DD-AFC4-6F175D3DCCD1}">
+            <a:ext uri="{909E8E84-426E-40dd-AFC4-6F175D3DCCD1}">
               <a14:hiddenFill xmlns:a14="http://schemas.microsoft.com/office/drawing/2010/main">
                 <a:solidFill>
                   <a:schemeClr val="accent1"/>
                 </a:solidFill>
               </a14:hiddenFill>
             </a:ext>
-            <a:ext uri="{91240B29-F687-4F45-9708-019B960494DF}">
+            <a:ext uri="{91240B29-F687-4f45-9708-019B960494DF}">
               <a14:hiddenLine xmlns:a14="http://schemas.microsoft.com/office/drawing/2010/main" w="9525">
                 <a:solidFill>
                   <a:schemeClr val="tx1"/>
@@ -4127,7 +4129,7 @@
                 <a:tailEnd/>
               </a14:hiddenLine>
             </a:ext>
-            <a:ext uri="{AF507438-7753-43E0-B8FC-AC1667EBCBE1}">
+            <a:ext uri="{AF507438-7753-43e0-B8FC-AC1667EBCBE1}">
               <a14:hiddenEffects xmlns:a14="http://schemas.microsoft.com/office/drawing/2010/main">
                 <a:effectLst>
                   <a:outerShdw dist="35921" dir="2700000" algn="ctr" rotWithShape="0">
@@ -4921,764 +4923,749 @@
           </a:fontRef>
         </p:style>
       </p:cxnSp>
-      <p:grpSp>
-        <p:nvGrpSpPr>
-          <p:cNvPr id="12" name="Group 11"/>
-          <p:cNvGrpSpPr/>
+      <p:pic>
+        <p:nvPicPr>
+          <p:cNvPr id="13" name="Picture 2"/>
+          <p:cNvPicPr>
+            <a:picLocks noChangeAspect="1" noChangeArrowheads="1"/>
+          </p:cNvPicPr>
           <p:nvPr/>
-        </p:nvGrpSpPr>
-        <p:grpSpPr>
+        </p:nvPicPr>
+        <p:blipFill rotWithShape="1">
+          <a:blip r:embed="rId2">
+            <a:extLst>
+              <a:ext uri="{BEBA8EAE-BF5A-486C-A8C5-ECC9F3942E4B}">
+                <a14:imgProps xmlns:a14="http://schemas.microsoft.com/office/drawing/2010/main">
+                  <a14:imgLayer r:embed="rId3">
+                    <a14:imgEffect>
+                      <a14:brightnessContrast bright="24000" contrast="44000"/>
+                    </a14:imgEffect>
+                  </a14:imgLayer>
+                </a14:imgProps>
+              </a:ext>
+              <a:ext uri="{28A0092B-C50C-407E-A947-70E740481C1C}">
+                <a14:useLocalDpi xmlns:a14="http://schemas.microsoft.com/office/drawing/2010/main" val="0"/>
+              </a:ext>
+            </a:extLst>
+          </a:blip>
+          <a:srcRect r="66689"/>
+          <a:stretch/>
+        </p:blipFill>
+        <p:spPr bwMode="auto">
           <a:xfrm>
             <a:off x="1945641" y="37254"/>
             <a:ext cx="5217160" cy="5091276"/>
-            <a:chOff x="1611341" y="659270"/>
-            <a:chExt cx="2476748" cy="2468244"/>
           </a:xfrm>
-        </p:grpSpPr>
-        <p:pic>
-          <p:nvPicPr>
-            <p:cNvPr id="13" name="Picture 2"/>
-            <p:cNvPicPr>
-              <a:picLocks noChangeAspect="1" noChangeArrowheads="1"/>
-            </p:cNvPicPr>
-            <p:nvPr/>
-          </p:nvPicPr>
-          <p:blipFill rotWithShape="1">
-            <a:blip r:embed="rId2">
-              <a:extLst>
-                <a:ext uri="{BEBA8EAE-BF5A-486C-A8C5-ECC9F3942E4B}">
-                  <a14:imgProps xmlns:a14="http://schemas.microsoft.com/office/drawing/2010/main">
-                    <a14:imgLayer r:embed="rId3">
-                      <a14:imgEffect>
-                        <a14:brightnessContrast bright="24000" contrast="44000"/>
-                      </a14:imgEffect>
-                    </a14:imgLayer>
-                  </a14:imgProps>
-                </a:ext>
-                <a:ext uri="{28A0092B-C50C-407E-A947-70E740481C1C}">
-                  <a14:useLocalDpi xmlns:a14="http://schemas.microsoft.com/office/drawing/2010/main" val="0"/>
-                </a:ext>
-              </a:extLst>
-            </a:blip>
-            <a:srcRect r="66689"/>
-            <a:stretch/>
-          </p:blipFill>
-          <p:spPr bwMode="auto">
-            <a:xfrm>
-              <a:off x="1611341" y="659270"/>
-              <a:ext cx="2476748" cy="2468244"/>
-            </a:xfrm>
-            <a:prstGeom prst="rect">
-              <a:avLst/>
-            </a:prstGeom>
+          <a:prstGeom prst="rect">
+            <a:avLst/>
+          </a:prstGeom>
+          <a:noFill/>
+          <a:ln>
             <a:noFill/>
-            <a:ln>
-              <a:noFill/>
-            </a:ln>
-            <a:effectLst/>
-            <a:extLst>
-              <a:ext uri="{909E8E84-426E-40DD-AFC4-6F175D3DCCD1}">
-                <a14:hiddenFill xmlns:a14="http://schemas.microsoft.com/office/drawing/2010/main">
-                  <a:solidFill>
-                    <a:schemeClr val="accent1"/>
-                  </a:solidFill>
-                </a14:hiddenFill>
-              </a:ext>
-              <a:ext uri="{91240B29-F687-4F45-9708-019B960494DF}">
-                <a14:hiddenLine xmlns:a14="http://schemas.microsoft.com/office/drawing/2010/main" w="9525">
-                  <a:solidFill>
-                    <a:schemeClr val="tx1"/>
-                  </a:solidFill>
-                  <a:miter lim="800000"/>
-                  <a:headEnd/>
-                  <a:tailEnd/>
-                </a14:hiddenLine>
-              </a:ext>
-              <a:ext uri="{AF507438-7753-43E0-B8FC-AC1667EBCBE1}">
-                <a14:hiddenEffects xmlns:a14="http://schemas.microsoft.com/office/drawing/2010/main">
-                  <a:effectLst>
-                    <a:outerShdw dist="35921" dir="2700000" algn="ctr" rotWithShape="0">
-                      <a:schemeClr val="bg2"/>
-                    </a:outerShdw>
-                  </a:effectLst>
-                </a14:hiddenEffects>
-              </a:ext>
-            </a:extLst>
-          </p:spPr>
-        </p:pic>
-        <p:sp>
-          <p:nvSpPr>
-            <p:cNvPr id="14" name="Oval 13"/>
-            <p:cNvSpPr/>
-            <p:nvPr/>
-          </p:nvSpPr>
-          <p:spPr>
-            <a:xfrm>
-              <a:off x="2780442" y="1804971"/>
-              <a:ext cx="72010" cy="72011"/>
-            </a:xfrm>
-            <a:prstGeom prst="ellipse">
-              <a:avLst/>
-            </a:prstGeom>
-            <a:solidFill>
-              <a:srgbClr val="FF0000">
-                <a:alpha val="94000"/>
-              </a:srgbClr>
-            </a:solidFill>
-            <a:ln>
-              <a:noFill/>
-            </a:ln>
-          </p:spPr>
-          <p:style>
-            <a:lnRef idx="2">
-              <a:schemeClr val="accent1">
-                <a:shade val="50000"/>
-              </a:schemeClr>
-            </a:lnRef>
-            <a:fillRef idx="1">
-              <a:schemeClr val="accent1"/>
-            </a:fillRef>
-            <a:effectRef idx="0">
-              <a:schemeClr val="accent1"/>
-            </a:effectRef>
-            <a:fontRef idx="minor">
-              <a:schemeClr val="lt1"/>
-            </a:fontRef>
-          </p:style>
-          <p:txBody>
-            <a:bodyPr rtlCol="0" anchor="ctr"/>
-            <a:lstStyle/>
-            <a:p>
-              <a:pPr algn="ctr"/>
-              <a:endParaRPr lang="en-US" dirty="0"/>
-            </a:p>
-          </p:txBody>
-        </p:sp>
-        <p:sp>
-          <p:nvSpPr>
-            <p:cNvPr id="15" name="Oval 14"/>
-            <p:cNvSpPr/>
-            <p:nvPr/>
-          </p:nvSpPr>
-          <p:spPr>
-            <a:xfrm>
-              <a:off x="2423005" y="1376269"/>
-              <a:ext cx="72010" cy="72011"/>
-            </a:xfrm>
-            <a:prstGeom prst="ellipse">
-              <a:avLst/>
-            </a:prstGeom>
-            <a:solidFill>
-              <a:srgbClr val="FF0000">
-                <a:alpha val="94000"/>
-              </a:srgbClr>
-            </a:solidFill>
-            <a:ln>
-              <a:noFill/>
-            </a:ln>
-          </p:spPr>
-          <p:style>
-            <a:lnRef idx="2">
-              <a:schemeClr val="accent1">
-                <a:shade val="50000"/>
-              </a:schemeClr>
-            </a:lnRef>
-            <a:fillRef idx="1">
-              <a:schemeClr val="accent1"/>
-            </a:fillRef>
-            <a:effectRef idx="0">
-              <a:schemeClr val="accent1"/>
-            </a:effectRef>
-            <a:fontRef idx="minor">
-              <a:schemeClr val="lt1"/>
-            </a:fontRef>
-          </p:style>
-          <p:txBody>
-            <a:bodyPr rtlCol="0" anchor="ctr"/>
-            <a:lstStyle/>
-            <a:p>
-              <a:pPr algn="ctr"/>
-              <a:endParaRPr lang="en-US" dirty="0"/>
-            </a:p>
-          </p:txBody>
-        </p:sp>
-        <p:sp>
-          <p:nvSpPr>
-            <p:cNvPr id="16" name="Oval 15"/>
-            <p:cNvSpPr/>
-            <p:nvPr/>
-          </p:nvSpPr>
-          <p:spPr>
-            <a:xfrm>
-              <a:off x="2392525" y="1137380"/>
-              <a:ext cx="72010" cy="72011"/>
-            </a:xfrm>
-            <a:prstGeom prst="ellipse">
-              <a:avLst/>
-            </a:prstGeom>
-            <a:solidFill>
-              <a:srgbClr val="FF0000">
-                <a:alpha val="94000"/>
-              </a:srgbClr>
-            </a:solidFill>
-            <a:ln>
-              <a:noFill/>
-            </a:ln>
-          </p:spPr>
-          <p:style>
-            <a:lnRef idx="2">
-              <a:schemeClr val="accent1">
-                <a:shade val="50000"/>
-              </a:schemeClr>
-            </a:lnRef>
-            <a:fillRef idx="1">
-              <a:schemeClr val="accent1"/>
-            </a:fillRef>
-            <a:effectRef idx="0">
-              <a:schemeClr val="accent1"/>
-            </a:effectRef>
-            <a:fontRef idx="minor">
-              <a:schemeClr val="lt1"/>
-            </a:fontRef>
-          </p:style>
-          <p:txBody>
-            <a:bodyPr rtlCol="0" anchor="ctr"/>
-            <a:lstStyle/>
-            <a:p>
-              <a:pPr algn="ctr"/>
-              <a:endParaRPr lang="en-US" dirty="0"/>
-            </a:p>
-          </p:txBody>
-        </p:sp>
-        <p:sp>
-          <p:nvSpPr>
-            <p:cNvPr id="17" name="Oval 16"/>
-            <p:cNvSpPr/>
-            <p:nvPr/>
-          </p:nvSpPr>
-          <p:spPr>
-            <a:xfrm>
-              <a:off x="2680565" y="906109"/>
-              <a:ext cx="72010" cy="72011"/>
-            </a:xfrm>
-            <a:prstGeom prst="ellipse">
-              <a:avLst/>
-            </a:prstGeom>
-            <a:solidFill>
-              <a:srgbClr val="FF0000">
-                <a:alpha val="94000"/>
-              </a:srgbClr>
-            </a:solidFill>
-            <a:ln>
-              <a:noFill/>
-            </a:ln>
-          </p:spPr>
-          <p:style>
-            <a:lnRef idx="2">
-              <a:schemeClr val="accent1">
-                <a:shade val="50000"/>
-              </a:schemeClr>
-            </a:lnRef>
-            <a:fillRef idx="1">
-              <a:schemeClr val="accent1"/>
-            </a:fillRef>
-            <a:effectRef idx="0">
-              <a:schemeClr val="accent1"/>
-            </a:effectRef>
-            <a:fontRef idx="minor">
-              <a:schemeClr val="lt1"/>
-            </a:fontRef>
-          </p:style>
-          <p:txBody>
-            <a:bodyPr rtlCol="0" anchor="ctr"/>
-            <a:lstStyle/>
-            <a:p>
-              <a:pPr algn="ctr"/>
-              <a:endParaRPr lang="en-US" dirty="0"/>
-            </a:p>
-          </p:txBody>
-        </p:sp>
-        <p:sp>
-          <p:nvSpPr>
-            <p:cNvPr id="18" name="Oval 17"/>
-            <p:cNvSpPr/>
-            <p:nvPr/>
-          </p:nvSpPr>
-          <p:spPr>
-            <a:xfrm>
-              <a:off x="2669515" y="1239869"/>
-              <a:ext cx="72010" cy="72011"/>
-            </a:xfrm>
-            <a:prstGeom prst="ellipse">
-              <a:avLst/>
-            </a:prstGeom>
-            <a:solidFill>
-              <a:srgbClr val="FF0000">
-                <a:alpha val="94000"/>
-              </a:srgbClr>
-            </a:solidFill>
-            <a:ln>
-              <a:noFill/>
-            </a:ln>
-          </p:spPr>
-          <p:style>
-            <a:lnRef idx="2">
-              <a:schemeClr val="accent1">
-                <a:shade val="50000"/>
-              </a:schemeClr>
-            </a:lnRef>
-            <a:fillRef idx="1">
-              <a:schemeClr val="accent1"/>
-            </a:fillRef>
-            <a:effectRef idx="0">
-              <a:schemeClr val="accent1"/>
-            </a:effectRef>
-            <a:fontRef idx="minor">
-              <a:schemeClr val="lt1"/>
-            </a:fontRef>
-          </p:style>
-          <p:txBody>
-            <a:bodyPr rtlCol="0" anchor="ctr"/>
-            <a:lstStyle/>
-            <a:p>
-              <a:pPr algn="ctr"/>
-              <a:endParaRPr lang="en-US" dirty="0"/>
-            </a:p>
-          </p:txBody>
-        </p:sp>
-        <p:sp>
-          <p:nvSpPr>
-            <p:cNvPr id="19" name="Oval 18"/>
-            <p:cNvSpPr/>
-            <p:nvPr/>
-          </p:nvSpPr>
-          <p:spPr>
-            <a:xfrm>
-              <a:off x="2862685" y="1201769"/>
-              <a:ext cx="72010" cy="72011"/>
-            </a:xfrm>
-            <a:prstGeom prst="ellipse">
-              <a:avLst/>
-            </a:prstGeom>
-            <a:solidFill>
-              <a:srgbClr val="FF0000">
-                <a:alpha val="94000"/>
-              </a:srgbClr>
-            </a:solidFill>
-            <a:ln>
-              <a:noFill/>
-            </a:ln>
-          </p:spPr>
-          <p:style>
-            <a:lnRef idx="2">
-              <a:schemeClr val="accent1">
-                <a:shade val="50000"/>
-              </a:schemeClr>
-            </a:lnRef>
-            <a:fillRef idx="1">
-              <a:schemeClr val="accent1"/>
-            </a:fillRef>
-            <a:effectRef idx="0">
-              <a:schemeClr val="accent1"/>
-            </a:effectRef>
-            <a:fontRef idx="minor">
-              <a:schemeClr val="lt1"/>
-            </a:fontRef>
-          </p:style>
-          <p:txBody>
-            <a:bodyPr rtlCol="0" anchor="ctr"/>
-            <a:lstStyle/>
-            <a:p>
-              <a:pPr algn="ctr"/>
-              <a:endParaRPr lang="en-US" dirty="0"/>
-            </a:p>
-          </p:txBody>
-        </p:sp>
-        <p:sp>
-          <p:nvSpPr>
-            <p:cNvPr id="20" name="Oval 19"/>
-            <p:cNvSpPr/>
-            <p:nvPr/>
-          </p:nvSpPr>
-          <p:spPr>
-            <a:xfrm>
-              <a:off x="2888975" y="849340"/>
-              <a:ext cx="72010" cy="72011"/>
-            </a:xfrm>
-            <a:prstGeom prst="ellipse">
-              <a:avLst/>
-            </a:prstGeom>
-            <a:solidFill>
-              <a:srgbClr val="FF0000">
-                <a:alpha val="94000"/>
-              </a:srgbClr>
-            </a:solidFill>
-            <a:ln>
-              <a:noFill/>
-            </a:ln>
-          </p:spPr>
-          <p:style>
-            <a:lnRef idx="2">
-              <a:schemeClr val="accent1">
-                <a:shade val="50000"/>
-              </a:schemeClr>
-            </a:lnRef>
-            <a:fillRef idx="1">
-              <a:schemeClr val="accent1"/>
-            </a:fillRef>
-            <a:effectRef idx="0">
-              <a:schemeClr val="accent1"/>
-            </a:effectRef>
-            <a:fontRef idx="minor">
-              <a:schemeClr val="lt1"/>
-            </a:fontRef>
-          </p:style>
-          <p:txBody>
-            <a:bodyPr rtlCol="0" anchor="ctr"/>
-            <a:lstStyle/>
-            <a:p>
-              <a:pPr algn="ctr"/>
-              <a:endParaRPr lang="en-US" dirty="0"/>
-            </a:p>
-          </p:txBody>
-        </p:sp>
-        <p:sp>
-          <p:nvSpPr>
-            <p:cNvPr id="21" name="Oval 20"/>
-            <p:cNvSpPr/>
-            <p:nvPr/>
-          </p:nvSpPr>
-          <p:spPr>
-            <a:xfrm>
-              <a:off x="3127865" y="970500"/>
-              <a:ext cx="72010" cy="72011"/>
-            </a:xfrm>
-            <a:prstGeom prst="ellipse">
-              <a:avLst/>
-            </a:prstGeom>
-            <a:solidFill>
-              <a:srgbClr val="FF0000">
-                <a:alpha val="94000"/>
-              </a:srgbClr>
-            </a:solidFill>
-            <a:ln>
-              <a:noFill/>
-            </a:ln>
-          </p:spPr>
-          <p:style>
-            <a:lnRef idx="2">
-              <a:schemeClr val="accent1">
-                <a:shade val="50000"/>
-              </a:schemeClr>
-            </a:lnRef>
-            <a:fillRef idx="1">
-              <a:schemeClr val="accent1"/>
-            </a:fillRef>
-            <a:effectRef idx="0">
-              <a:schemeClr val="accent1"/>
-            </a:effectRef>
-            <a:fontRef idx="minor">
-              <a:schemeClr val="lt1"/>
-            </a:fontRef>
-          </p:style>
-          <p:txBody>
-            <a:bodyPr rtlCol="0" anchor="ctr"/>
-            <a:lstStyle/>
-            <a:p>
-              <a:pPr algn="ctr"/>
-              <a:endParaRPr lang="en-US" dirty="0"/>
-            </a:p>
-          </p:txBody>
-        </p:sp>
-        <p:sp>
-          <p:nvSpPr>
-            <p:cNvPr id="22" name="Oval 21"/>
-            <p:cNvSpPr/>
-            <p:nvPr/>
-          </p:nvSpPr>
-          <p:spPr>
-            <a:xfrm>
-              <a:off x="3086335" y="1281400"/>
-              <a:ext cx="72010" cy="72011"/>
-            </a:xfrm>
-            <a:prstGeom prst="ellipse">
-              <a:avLst/>
-            </a:prstGeom>
-            <a:solidFill>
-              <a:srgbClr val="FF0000">
-                <a:alpha val="94000"/>
-              </a:srgbClr>
-            </a:solidFill>
-            <a:ln>
-              <a:noFill/>
-            </a:ln>
-          </p:spPr>
-          <p:style>
-            <a:lnRef idx="2">
-              <a:schemeClr val="accent1">
-                <a:shade val="50000"/>
-              </a:schemeClr>
-            </a:lnRef>
-            <a:fillRef idx="1">
-              <a:schemeClr val="accent1"/>
-            </a:fillRef>
-            <a:effectRef idx="0">
-              <a:schemeClr val="accent1"/>
-            </a:effectRef>
-            <a:fontRef idx="minor">
-              <a:schemeClr val="lt1"/>
-            </a:fontRef>
-          </p:style>
-          <p:txBody>
-            <a:bodyPr rtlCol="0" anchor="ctr"/>
-            <a:lstStyle/>
-            <a:p>
-              <a:pPr algn="ctr"/>
-              <a:endParaRPr lang="en-US" dirty="0"/>
-            </a:p>
-          </p:txBody>
-        </p:sp>
-        <p:sp>
-          <p:nvSpPr>
-            <p:cNvPr id="23" name="Oval 22"/>
-            <p:cNvSpPr/>
-            <p:nvPr/>
-          </p:nvSpPr>
-          <p:spPr>
-            <a:xfrm>
-              <a:off x="3238735" y="1610969"/>
-              <a:ext cx="72010" cy="72011"/>
-            </a:xfrm>
-            <a:prstGeom prst="ellipse">
-              <a:avLst/>
-            </a:prstGeom>
-            <a:solidFill>
-              <a:srgbClr val="FF0000">
-                <a:alpha val="94000"/>
-              </a:srgbClr>
-            </a:solidFill>
-            <a:ln>
-              <a:noFill/>
-            </a:ln>
-          </p:spPr>
-          <p:style>
-            <a:lnRef idx="2">
-              <a:schemeClr val="accent1">
-                <a:shade val="50000"/>
-              </a:schemeClr>
-            </a:lnRef>
-            <a:fillRef idx="1">
-              <a:schemeClr val="accent1"/>
-            </a:fillRef>
-            <a:effectRef idx="0">
-              <a:schemeClr val="accent1"/>
-            </a:effectRef>
-            <a:fontRef idx="minor">
-              <a:schemeClr val="lt1"/>
-            </a:fontRef>
-          </p:style>
-          <p:txBody>
-            <a:bodyPr rtlCol="0" anchor="ctr"/>
-            <a:lstStyle/>
-            <a:p>
-              <a:pPr algn="ctr"/>
-              <a:endParaRPr lang="en-US" dirty="0"/>
-            </a:p>
-          </p:txBody>
-        </p:sp>
-        <p:sp>
-          <p:nvSpPr>
-            <p:cNvPr id="24" name="Oval 23"/>
-            <p:cNvSpPr/>
-            <p:nvPr/>
-          </p:nvSpPr>
-          <p:spPr>
-            <a:xfrm>
-              <a:off x="3230355" y="1778609"/>
-              <a:ext cx="72010" cy="72011"/>
-            </a:xfrm>
-            <a:prstGeom prst="ellipse">
-              <a:avLst/>
-            </a:prstGeom>
-            <a:solidFill>
-              <a:srgbClr val="FF0000">
-                <a:alpha val="94000"/>
-              </a:srgbClr>
-            </a:solidFill>
-            <a:ln>
-              <a:noFill/>
-            </a:ln>
-          </p:spPr>
-          <p:style>
-            <a:lnRef idx="2">
-              <a:schemeClr val="accent1">
-                <a:shade val="50000"/>
-              </a:schemeClr>
-            </a:lnRef>
-            <a:fillRef idx="1">
-              <a:schemeClr val="accent1"/>
-            </a:fillRef>
-            <a:effectRef idx="0">
-              <a:schemeClr val="accent1"/>
-            </a:effectRef>
-            <a:fontRef idx="minor">
-              <a:schemeClr val="lt1"/>
-            </a:fontRef>
-          </p:style>
-          <p:txBody>
-            <a:bodyPr rtlCol="0" anchor="ctr"/>
-            <a:lstStyle/>
-            <a:p>
-              <a:pPr algn="ctr"/>
-              <a:endParaRPr lang="en-US" dirty="0"/>
-            </a:p>
-          </p:txBody>
-        </p:sp>
-        <p:sp>
-          <p:nvSpPr>
-            <p:cNvPr id="25" name="Oval 24"/>
-            <p:cNvSpPr/>
-            <p:nvPr/>
-          </p:nvSpPr>
-          <p:spPr>
-            <a:xfrm>
-              <a:off x="3093955" y="2073509"/>
-              <a:ext cx="72010" cy="72011"/>
-            </a:xfrm>
-            <a:prstGeom prst="ellipse">
-              <a:avLst/>
-            </a:prstGeom>
-            <a:solidFill>
-              <a:srgbClr val="FF0000">
-                <a:alpha val="94000"/>
-              </a:srgbClr>
-            </a:solidFill>
-            <a:ln>
-              <a:noFill/>
-            </a:ln>
-          </p:spPr>
-          <p:style>
-            <a:lnRef idx="2">
-              <a:schemeClr val="accent1">
-                <a:shade val="50000"/>
-              </a:schemeClr>
-            </a:lnRef>
-            <a:fillRef idx="1">
-              <a:schemeClr val="accent1"/>
-            </a:fillRef>
-            <a:effectRef idx="0">
-              <a:schemeClr val="accent1"/>
-            </a:effectRef>
-            <a:fontRef idx="minor">
-              <a:schemeClr val="lt1"/>
-            </a:fontRef>
-          </p:style>
-          <p:txBody>
-            <a:bodyPr rtlCol="0" anchor="ctr"/>
-            <a:lstStyle/>
-            <a:p>
-              <a:pPr algn="ctr"/>
-              <a:endParaRPr lang="en-US" dirty="0"/>
-            </a:p>
-          </p:txBody>
-        </p:sp>
-        <p:sp>
-          <p:nvSpPr>
-            <p:cNvPr id="26" name="Oval 25"/>
-            <p:cNvSpPr/>
-            <p:nvPr/>
-          </p:nvSpPr>
-          <p:spPr>
-            <a:xfrm>
-              <a:off x="2775435" y="2433560"/>
-              <a:ext cx="72010" cy="72011"/>
-            </a:xfrm>
-            <a:prstGeom prst="ellipse">
-              <a:avLst/>
-            </a:prstGeom>
-            <a:solidFill>
-              <a:srgbClr val="FF0000">
-                <a:alpha val="94000"/>
-              </a:srgbClr>
-            </a:solidFill>
-            <a:ln>
-              <a:noFill/>
-            </a:ln>
-          </p:spPr>
-          <p:style>
-            <a:lnRef idx="2">
-              <a:schemeClr val="accent1">
-                <a:shade val="50000"/>
-              </a:schemeClr>
-            </a:lnRef>
-            <a:fillRef idx="1">
-              <a:schemeClr val="accent1"/>
-            </a:fillRef>
-            <a:effectRef idx="0">
-              <a:schemeClr val="accent1"/>
-            </a:effectRef>
-            <a:fontRef idx="minor">
-              <a:schemeClr val="lt1"/>
-            </a:fontRef>
-          </p:style>
-          <p:txBody>
-            <a:bodyPr rtlCol="0" anchor="ctr"/>
-            <a:lstStyle/>
-            <a:p>
-              <a:pPr algn="ctr"/>
-              <a:endParaRPr lang="en-US" dirty="0"/>
-            </a:p>
-          </p:txBody>
-        </p:sp>
-        <p:sp>
-          <p:nvSpPr>
-            <p:cNvPr id="27" name="Oval 26"/>
-            <p:cNvSpPr/>
-            <p:nvPr/>
-          </p:nvSpPr>
-          <p:spPr>
-            <a:xfrm>
-              <a:off x="2567025" y="2369169"/>
-              <a:ext cx="72010" cy="72011"/>
-            </a:xfrm>
-            <a:prstGeom prst="ellipse">
-              <a:avLst/>
-            </a:prstGeom>
-            <a:solidFill>
-              <a:srgbClr val="FF0000">
-                <a:alpha val="94000"/>
-              </a:srgbClr>
-            </a:solidFill>
-            <a:ln>
-              <a:noFill/>
-            </a:ln>
-          </p:spPr>
-          <p:style>
-            <a:lnRef idx="2">
-              <a:schemeClr val="accent1">
-                <a:shade val="50000"/>
-              </a:schemeClr>
-            </a:lnRef>
-            <a:fillRef idx="1">
-              <a:schemeClr val="accent1"/>
-            </a:fillRef>
-            <a:effectRef idx="0">
-              <a:schemeClr val="accent1"/>
-            </a:effectRef>
-            <a:fontRef idx="minor">
-              <a:schemeClr val="lt1"/>
-            </a:fontRef>
-          </p:style>
-          <p:txBody>
-            <a:bodyPr rtlCol="0" anchor="ctr"/>
-            <a:lstStyle/>
-            <a:p>
-              <a:pPr algn="ctr"/>
-              <a:endParaRPr lang="en-US" dirty="0"/>
-            </a:p>
-          </p:txBody>
-        </p:sp>
-      </p:grpSp>
+          </a:ln>
+          <a:effectLst/>
+          <a:extLst>
+            <a:ext uri="{909E8E84-426E-40dd-AFC4-6F175D3DCCD1}">
+              <a14:hiddenFill xmlns:a14="http://schemas.microsoft.com/office/drawing/2010/main">
+                <a:solidFill>
+                  <a:schemeClr val="accent1"/>
+                </a:solidFill>
+              </a14:hiddenFill>
+            </a:ext>
+            <a:ext uri="{91240B29-F687-4f45-9708-019B960494DF}">
+              <a14:hiddenLine xmlns:a14="http://schemas.microsoft.com/office/drawing/2010/main" w="9525">
+                <a:solidFill>
+                  <a:schemeClr val="tx1"/>
+                </a:solidFill>
+                <a:miter lim="800000"/>
+                <a:headEnd/>
+                <a:tailEnd/>
+              </a14:hiddenLine>
+            </a:ext>
+            <a:ext uri="{AF507438-7753-43e0-B8FC-AC1667EBCBE1}">
+              <a14:hiddenEffects xmlns:a14="http://schemas.microsoft.com/office/drawing/2010/main">
+                <a:effectLst>
+                  <a:outerShdw dist="35921" dir="2700000" algn="ctr" rotWithShape="0">
+                    <a:schemeClr val="bg2"/>
+                  </a:outerShdw>
+                </a:effectLst>
+              </a14:hiddenEffects>
+            </a:ext>
+          </a:extLst>
+        </p:spPr>
+      </p:pic>
+      <p:sp>
+        <p:nvSpPr>
+          <p:cNvPr id="14" name="Oval 13"/>
+          <p:cNvSpPr/>
+          <p:nvPr/>
+        </p:nvSpPr>
+        <p:spPr>
+          <a:xfrm>
+            <a:off x="4572714" y="2514600"/>
+            <a:ext cx="151686" cy="148538"/>
+          </a:xfrm>
+          <a:prstGeom prst="ellipse">
+            <a:avLst/>
+          </a:prstGeom>
+          <a:solidFill>
+            <a:srgbClr val="FF0000">
+              <a:alpha val="94000"/>
+            </a:srgbClr>
+          </a:solidFill>
+          <a:ln>
+            <a:noFill/>
+          </a:ln>
+        </p:spPr>
+        <p:style>
+          <a:lnRef idx="2">
+            <a:schemeClr val="accent1">
+              <a:shade val="50000"/>
+            </a:schemeClr>
+          </a:lnRef>
+          <a:fillRef idx="1">
+            <a:schemeClr val="accent1"/>
+          </a:fillRef>
+          <a:effectRef idx="0">
+            <a:schemeClr val="accent1"/>
+          </a:effectRef>
+          <a:fontRef idx="minor">
+            <a:schemeClr val="lt1"/>
+          </a:fontRef>
+        </p:style>
+        <p:txBody>
+          <a:bodyPr rtlCol="0" anchor="ctr"/>
+          <a:lstStyle/>
+          <a:p>
+            <a:pPr algn="ctr"/>
+            <a:endParaRPr lang="en-US" dirty="0"/>
+          </a:p>
+        </p:txBody>
+      </p:sp>
+      <p:sp>
+        <p:nvSpPr>
+          <p:cNvPr id="15" name="Oval 14"/>
+          <p:cNvSpPr/>
+          <p:nvPr/>
+        </p:nvSpPr>
+        <p:spPr>
+          <a:xfrm>
+            <a:off x="3734514" y="1577874"/>
+            <a:ext cx="151686" cy="148538"/>
+          </a:xfrm>
+          <a:prstGeom prst="ellipse">
+            <a:avLst/>
+          </a:prstGeom>
+          <a:solidFill>
+            <a:srgbClr val="FF0000">
+              <a:alpha val="94000"/>
+            </a:srgbClr>
+          </a:solidFill>
+          <a:ln>
+            <a:noFill/>
+          </a:ln>
+        </p:spPr>
+        <p:style>
+          <a:lnRef idx="2">
+            <a:schemeClr val="accent1">
+              <a:shade val="50000"/>
+            </a:schemeClr>
+          </a:lnRef>
+          <a:fillRef idx="1">
+            <a:schemeClr val="accent1"/>
+          </a:fillRef>
+          <a:effectRef idx="0">
+            <a:schemeClr val="accent1"/>
+          </a:effectRef>
+          <a:fontRef idx="minor">
+            <a:schemeClr val="lt1"/>
+          </a:fontRef>
+        </p:style>
+        <p:txBody>
+          <a:bodyPr rtlCol="0" anchor="ctr"/>
+          <a:lstStyle/>
+          <a:p>
+            <a:pPr algn="ctr"/>
+            <a:endParaRPr lang="en-US" dirty="0"/>
+          </a:p>
+        </p:txBody>
+      </p:sp>
+      <p:sp>
+        <p:nvSpPr>
+          <p:cNvPr id="16" name="Oval 15"/>
+          <p:cNvSpPr/>
+          <p:nvPr/>
+        </p:nvSpPr>
+        <p:spPr>
+          <a:xfrm>
+            <a:off x="3708328" y="1107580"/>
+            <a:ext cx="151686" cy="148538"/>
+          </a:xfrm>
+          <a:prstGeom prst="ellipse">
+            <a:avLst/>
+          </a:prstGeom>
+          <a:solidFill>
+            <a:srgbClr val="FF0000">
+              <a:alpha val="94000"/>
+            </a:srgbClr>
+          </a:solidFill>
+          <a:ln>
+            <a:noFill/>
+          </a:ln>
+        </p:spPr>
+        <p:style>
+          <a:lnRef idx="2">
+            <a:schemeClr val="accent1">
+              <a:shade val="50000"/>
+            </a:schemeClr>
+          </a:lnRef>
+          <a:fillRef idx="1">
+            <a:schemeClr val="accent1"/>
+          </a:fillRef>
+          <a:effectRef idx="0">
+            <a:schemeClr val="accent1"/>
+          </a:effectRef>
+          <a:fontRef idx="minor">
+            <a:schemeClr val="lt1"/>
+          </a:fontRef>
+        </p:style>
+        <p:txBody>
+          <a:bodyPr rtlCol="0" anchor="ctr"/>
+          <a:lstStyle/>
+          <a:p>
+            <a:pPr algn="ctr"/>
+            <a:endParaRPr lang="en-US" dirty="0"/>
+          </a:p>
+        </p:txBody>
+      </p:sp>
+      <p:sp>
+        <p:nvSpPr>
+          <p:cNvPr id="17" name="Oval 16"/>
+          <p:cNvSpPr/>
+          <p:nvPr/>
+        </p:nvSpPr>
+        <p:spPr>
+          <a:xfrm>
+            <a:off x="4276472" y="572600"/>
+            <a:ext cx="151686" cy="148538"/>
+          </a:xfrm>
+          <a:prstGeom prst="ellipse">
+            <a:avLst/>
+          </a:prstGeom>
+          <a:solidFill>
+            <a:srgbClr val="FF0000">
+              <a:alpha val="94000"/>
+            </a:srgbClr>
+          </a:solidFill>
+          <a:ln>
+            <a:noFill/>
+          </a:ln>
+        </p:spPr>
+        <p:style>
+          <a:lnRef idx="2">
+            <a:schemeClr val="accent1">
+              <a:shade val="50000"/>
+            </a:schemeClr>
+          </a:lnRef>
+          <a:fillRef idx="1">
+            <a:schemeClr val="accent1"/>
+          </a:fillRef>
+          <a:effectRef idx="0">
+            <a:schemeClr val="accent1"/>
+          </a:effectRef>
+          <a:fontRef idx="minor">
+            <a:schemeClr val="lt1"/>
+          </a:fontRef>
+        </p:style>
+        <p:txBody>
+          <a:bodyPr rtlCol="0" anchor="ctr"/>
+          <a:lstStyle/>
+          <a:p>
+            <a:pPr algn="ctr"/>
+            <a:endParaRPr lang="en-US" dirty="0"/>
+          </a:p>
+        </p:txBody>
+      </p:sp>
+      <p:sp>
+        <p:nvSpPr>
+          <p:cNvPr id="18" name="Oval 17"/>
+          <p:cNvSpPr/>
+          <p:nvPr/>
+        </p:nvSpPr>
+        <p:spPr>
+          <a:xfrm>
+            <a:off x="4243372" y="1286168"/>
+            <a:ext cx="151686" cy="148538"/>
+          </a:xfrm>
+          <a:prstGeom prst="ellipse">
+            <a:avLst/>
+          </a:prstGeom>
+          <a:solidFill>
+            <a:srgbClr val="FF0000">
+              <a:alpha val="94000"/>
+            </a:srgbClr>
+          </a:solidFill>
+          <a:ln>
+            <a:noFill/>
+          </a:ln>
+        </p:spPr>
+        <p:style>
+          <a:lnRef idx="2">
+            <a:schemeClr val="accent1">
+              <a:shade val="50000"/>
+            </a:schemeClr>
+          </a:lnRef>
+          <a:fillRef idx="1">
+            <a:schemeClr val="accent1"/>
+          </a:fillRef>
+          <a:effectRef idx="0">
+            <a:schemeClr val="accent1"/>
+          </a:effectRef>
+          <a:fontRef idx="minor">
+            <a:schemeClr val="lt1"/>
+          </a:fontRef>
+        </p:style>
+        <p:txBody>
+          <a:bodyPr rtlCol="0" anchor="ctr"/>
+          <a:lstStyle/>
+          <a:p>
+            <a:pPr algn="ctr"/>
+            <a:endParaRPr lang="en-US" dirty="0"/>
+          </a:p>
+        </p:txBody>
+      </p:sp>
+      <p:sp>
+        <p:nvSpPr>
+          <p:cNvPr id="19" name="Oval 18"/>
+          <p:cNvSpPr/>
+          <p:nvPr/>
+        </p:nvSpPr>
+        <p:spPr>
+          <a:xfrm>
+            <a:off x="4686286" y="1116991"/>
+            <a:ext cx="151686" cy="148538"/>
+          </a:xfrm>
+          <a:prstGeom prst="ellipse">
+            <a:avLst/>
+          </a:prstGeom>
+          <a:solidFill>
+            <a:srgbClr val="FF0000">
+              <a:alpha val="94000"/>
+            </a:srgbClr>
+          </a:solidFill>
+          <a:ln>
+            <a:noFill/>
+          </a:ln>
+        </p:spPr>
+        <p:style>
+          <a:lnRef idx="2">
+            <a:schemeClr val="accent1">
+              <a:shade val="50000"/>
+            </a:schemeClr>
+          </a:lnRef>
+          <a:fillRef idx="1">
+            <a:schemeClr val="accent1"/>
+          </a:fillRef>
+          <a:effectRef idx="0">
+            <a:schemeClr val="accent1"/>
+          </a:effectRef>
+          <a:fontRef idx="minor">
+            <a:schemeClr val="lt1"/>
+          </a:fontRef>
+        </p:style>
+        <p:txBody>
+          <a:bodyPr rtlCol="0" anchor="ctr"/>
+          <a:lstStyle/>
+          <a:p>
+            <a:pPr algn="ctr"/>
+            <a:endParaRPr lang="en-US" dirty="0"/>
+          </a:p>
+        </p:txBody>
+      </p:sp>
+      <p:sp>
+        <p:nvSpPr>
+          <p:cNvPr id="20" name="Oval 19"/>
+          <p:cNvSpPr/>
+          <p:nvPr/>
+        </p:nvSpPr>
+        <p:spPr>
+          <a:xfrm>
+            <a:off x="4741664" y="429314"/>
+            <a:ext cx="151686" cy="148538"/>
+          </a:xfrm>
+          <a:prstGeom prst="ellipse">
+            <a:avLst/>
+          </a:prstGeom>
+          <a:solidFill>
+            <a:srgbClr val="FF0000">
+              <a:alpha val="94000"/>
+            </a:srgbClr>
+          </a:solidFill>
+          <a:ln>
+            <a:noFill/>
+          </a:ln>
+        </p:spPr>
+        <p:style>
+          <a:lnRef idx="2">
+            <a:schemeClr val="accent1">
+              <a:shade val="50000"/>
+            </a:schemeClr>
+          </a:lnRef>
+          <a:fillRef idx="1">
+            <a:schemeClr val="accent1"/>
+          </a:fillRef>
+          <a:effectRef idx="0">
+            <a:schemeClr val="accent1"/>
+          </a:effectRef>
+          <a:fontRef idx="minor">
+            <a:schemeClr val="lt1"/>
+          </a:fontRef>
+        </p:style>
+        <p:txBody>
+          <a:bodyPr rtlCol="0" anchor="ctr"/>
+          <a:lstStyle/>
+          <a:p>
+            <a:pPr algn="ctr"/>
+            <a:endParaRPr lang="en-US" dirty="0"/>
+          </a:p>
+        </p:txBody>
+      </p:sp>
+      <p:sp>
+        <p:nvSpPr>
+          <p:cNvPr id="21" name="Oval 20"/>
+          <p:cNvSpPr/>
+          <p:nvPr/>
+        </p:nvSpPr>
+        <p:spPr>
+          <a:xfrm>
+            <a:off x="5244876" y="679232"/>
+            <a:ext cx="151686" cy="148538"/>
+          </a:xfrm>
+          <a:prstGeom prst="ellipse">
+            <a:avLst/>
+          </a:prstGeom>
+          <a:solidFill>
+            <a:srgbClr val="FF0000">
+              <a:alpha val="94000"/>
+            </a:srgbClr>
+          </a:solidFill>
+          <a:ln>
+            <a:noFill/>
+          </a:ln>
+        </p:spPr>
+        <p:style>
+          <a:lnRef idx="2">
+            <a:schemeClr val="accent1">
+              <a:shade val="50000"/>
+            </a:schemeClr>
+          </a:lnRef>
+          <a:fillRef idx="1">
+            <a:schemeClr val="accent1"/>
+          </a:fillRef>
+          <a:effectRef idx="0">
+            <a:schemeClr val="accent1"/>
+          </a:effectRef>
+          <a:fontRef idx="minor">
+            <a:schemeClr val="lt1"/>
+          </a:fontRef>
+        </p:style>
+        <p:txBody>
+          <a:bodyPr rtlCol="0" anchor="ctr"/>
+          <a:lstStyle/>
+          <a:p>
+            <a:pPr algn="ctr"/>
+            <a:endParaRPr lang="en-US" dirty="0"/>
+          </a:p>
+        </p:txBody>
+      </p:sp>
+      <p:sp>
+        <p:nvSpPr>
+          <p:cNvPr id="22" name="Oval 21"/>
+          <p:cNvSpPr/>
+          <p:nvPr/>
+        </p:nvSpPr>
+        <p:spPr>
+          <a:xfrm>
+            <a:off x="5170488" y="1346717"/>
+            <a:ext cx="151686" cy="148538"/>
+          </a:xfrm>
+          <a:prstGeom prst="ellipse">
+            <a:avLst/>
+          </a:prstGeom>
+          <a:solidFill>
+            <a:srgbClr val="FF0000">
+              <a:alpha val="94000"/>
+            </a:srgbClr>
+          </a:solidFill>
+          <a:ln>
+            <a:noFill/>
+          </a:ln>
+        </p:spPr>
+        <p:style>
+          <a:lnRef idx="2">
+            <a:schemeClr val="accent1">
+              <a:shade val="50000"/>
+            </a:schemeClr>
+          </a:lnRef>
+          <a:fillRef idx="1">
+            <a:schemeClr val="accent1"/>
+          </a:fillRef>
+          <a:effectRef idx="0">
+            <a:schemeClr val="accent1"/>
+          </a:effectRef>
+          <a:fontRef idx="minor">
+            <a:schemeClr val="lt1"/>
+          </a:fontRef>
+        </p:style>
+        <p:txBody>
+          <a:bodyPr rtlCol="0" anchor="ctr"/>
+          <a:lstStyle/>
+          <a:p>
+            <a:pPr algn="ctr"/>
+            <a:endParaRPr lang="en-US" dirty="0"/>
+          </a:p>
+        </p:txBody>
+      </p:sp>
+      <p:sp>
+        <p:nvSpPr>
+          <p:cNvPr id="23" name="Oval 22"/>
+          <p:cNvSpPr/>
+          <p:nvPr/>
+        </p:nvSpPr>
+        <p:spPr>
+          <a:xfrm>
+            <a:off x="5426046" y="2052711"/>
+            <a:ext cx="151686" cy="148538"/>
+          </a:xfrm>
+          <a:prstGeom prst="ellipse">
+            <a:avLst/>
+          </a:prstGeom>
+          <a:solidFill>
+            <a:srgbClr val="FF0000">
+              <a:alpha val="94000"/>
+            </a:srgbClr>
+          </a:solidFill>
+          <a:ln>
+            <a:noFill/>
+          </a:ln>
+        </p:spPr>
+        <p:style>
+          <a:lnRef idx="2">
+            <a:schemeClr val="accent1">
+              <a:shade val="50000"/>
+            </a:schemeClr>
+          </a:lnRef>
+          <a:fillRef idx="1">
+            <a:schemeClr val="accent1"/>
+          </a:fillRef>
+          <a:effectRef idx="0">
+            <a:schemeClr val="accent1"/>
+          </a:effectRef>
+          <a:fontRef idx="minor">
+            <a:schemeClr val="lt1"/>
+          </a:fontRef>
+        </p:style>
+        <p:txBody>
+          <a:bodyPr rtlCol="0" anchor="ctr"/>
+          <a:lstStyle/>
+          <a:p>
+            <a:pPr algn="ctr"/>
+            <a:endParaRPr lang="en-US" dirty="0"/>
+          </a:p>
+        </p:txBody>
+      </p:sp>
+      <p:sp>
+        <p:nvSpPr>
+          <p:cNvPr id="24" name="Oval 23"/>
+          <p:cNvSpPr/>
+          <p:nvPr/>
+        </p:nvSpPr>
+        <p:spPr>
+          <a:xfrm>
+            <a:off x="5410914" y="2514600"/>
+            <a:ext cx="151686" cy="148538"/>
+          </a:xfrm>
+          <a:prstGeom prst="ellipse">
+            <a:avLst/>
+          </a:prstGeom>
+          <a:solidFill>
+            <a:srgbClr val="FF0000">
+              <a:alpha val="94000"/>
+            </a:srgbClr>
+          </a:solidFill>
+          <a:ln>
+            <a:noFill/>
+          </a:ln>
+        </p:spPr>
+        <p:style>
+          <a:lnRef idx="2">
+            <a:schemeClr val="accent1">
+              <a:shade val="50000"/>
+            </a:schemeClr>
+          </a:lnRef>
+          <a:fillRef idx="1">
+            <a:schemeClr val="accent1"/>
+          </a:fillRef>
+          <a:effectRef idx="0">
+            <a:schemeClr val="accent1"/>
+          </a:effectRef>
+          <a:fontRef idx="minor">
+            <a:schemeClr val="lt1"/>
+          </a:fontRef>
+        </p:style>
+        <p:txBody>
+          <a:bodyPr rtlCol="0" anchor="ctr"/>
+          <a:lstStyle/>
+          <a:p>
+            <a:pPr algn="ctr"/>
+            <a:endParaRPr lang="en-US" dirty="0"/>
+          </a:p>
+        </p:txBody>
+      </p:sp>
+      <p:sp>
+        <p:nvSpPr>
+          <p:cNvPr id="25" name="Oval 24"/>
+          <p:cNvSpPr/>
+          <p:nvPr/>
+        </p:nvSpPr>
+        <p:spPr>
+          <a:xfrm>
+            <a:off x="5295435" y="2975662"/>
+            <a:ext cx="151686" cy="148538"/>
+          </a:xfrm>
+          <a:prstGeom prst="ellipse">
+            <a:avLst/>
+          </a:prstGeom>
+          <a:solidFill>
+            <a:srgbClr val="FF0000">
+              <a:alpha val="94000"/>
+            </a:srgbClr>
+          </a:solidFill>
+          <a:ln>
+            <a:noFill/>
+          </a:ln>
+        </p:spPr>
+        <p:style>
+          <a:lnRef idx="2">
+            <a:schemeClr val="accent1">
+              <a:shade val="50000"/>
+            </a:schemeClr>
+          </a:lnRef>
+          <a:fillRef idx="1">
+            <a:schemeClr val="accent1"/>
+          </a:fillRef>
+          <a:effectRef idx="0">
+            <a:schemeClr val="accent1"/>
+          </a:effectRef>
+          <a:fontRef idx="minor">
+            <a:schemeClr val="lt1"/>
+          </a:fontRef>
+        </p:style>
+        <p:txBody>
+          <a:bodyPr rtlCol="0" anchor="ctr"/>
+          <a:lstStyle/>
+          <a:p>
+            <a:pPr algn="ctr"/>
+            <a:endParaRPr lang="en-US" dirty="0"/>
+          </a:p>
+        </p:txBody>
+      </p:sp>
+      <p:sp>
+        <p:nvSpPr>
+          <p:cNvPr id="26" name="Oval 25"/>
+          <p:cNvSpPr/>
+          <p:nvPr/>
+        </p:nvSpPr>
+        <p:spPr>
+          <a:xfrm>
+            <a:off x="4548172" y="3737662"/>
+            <a:ext cx="151686" cy="148538"/>
+          </a:xfrm>
+          <a:prstGeom prst="ellipse">
+            <a:avLst/>
+          </a:prstGeom>
+          <a:solidFill>
+            <a:srgbClr val="FF0000">
+              <a:alpha val="94000"/>
+            </a:srgbClr>
+          </a:solidFill>
+          <a:ln>
+            <a:noFill/>
+          </a:ln>
+        </p:spPr>
+        <p:style>
+          <a:lnRef idx="2">
+            <a:schemeClr val="accent1">
+              <a:shade val="50000"/>
+            </a:schemeClr>
+          </a:lnRef>
+          <a:fillRef idx="1">
+            <a:schemeClr val="accent1"/>
+          </a:fillRef>
+          <a:effectRef idx="0">
+            <a:schemeClr val="accent1"/>
+          </a:effectRef>
+          <a:fontRef idx="minor">
+            <a:schemeClr val="lt1"/>
+          </a:fontRef>
+        </p:style>
+        <p:txBody>
+          <a:bodyPr rtlCol="0" anchor="ctr"/>
+          <a:lstStyle/>
+          <a:p>
+            <a:pPr algn="ctr"/>
+            <a:endParaRPr lang="en-US" dirty="0"/>
+          </a:p>
+        </p:txBody>
+      </p:sp>
+      <p:sp>
+        <p:nvSpPr>
+          <p:cNvPr id="27" name="Oval 26"/>
+          <p:cNvSpPr/>
+          <p:nvPr/>
+        </p:nvSpPr>
+        <p:spPr>
+          <a:xfrm>
+            <a:off x="4114800" y="3695223"/>
+            <a:ext cx="151686" cy="148538"/>
+          </a:xfrm>
+          <a:prstGeom prst="ellipse">
+            <a:avLst/>
+          </a:prstGeom>
+          <a:solidFill>
+            <a:srgbClr val="FF0000">
+              <a:alpha val="94000"/>
+            </a:srgbClr>
+          </a:solidFill>
+          <a:ln>
+            <a:noFill/>
+          </a:ln>
+        </p:spPr>
+        <p:style>
+          <a:lnRef idx="2">
+            <a:schemeClr val="accent1">
+              <a:shade val="50000"/>
+            </a:schemeClr>
+          </a:lnRef>
+          <a:fillRef idx="1">
+            <a:schemeClr val="accent1"/>
+          </a:fillRef>
+          <a:effectRef idx="0">
+            <a:schemeClr val="accent1"/>
+          </a:effectRef>
+          <a:fontRef idx="minor">
+            <a:schemeClr val="lt1"/>
+          </a:fontRef>
+        </p:style>
+        <p:txBody>
+          <a:bodyPr rtlCol="0" anchor="ctr"/>
+          <a:lstStyle/>
+          <a:p>
+            <a:pPr algn="ctr"/>
+            <a:endParaRPr lang="en-US" dirty="0"/>
+          </a:p>
+        </p:txBody>
+      </p:sp>
     </p:spTree>
     <p:extLst>
       <p:ext uri="{BB962C8B-B14F-4D97-AF65-F5344CB8AC3E}">
@@ -5711,56 +5698,26 @@
       </p:grpSpPr>
       <p:pic>
         <p:nvPicPr>
-          <p:cNvPr id="10" name="Picture 5"/>
+          <p:cNvPr id="11" name="Picture 10"/>
           <p:cNvPicPr>
-            <a:picLocks noChangeAspect="1" noChangeArrowheads="1"/>
+            <a:picLocks noChangeAspect="1"/>
           </p:cNvPicPr>
           <p:nvPr/>
         </p:nvPicPr>
         <p:blipFill>
-          <a:blip r:embed="rId2">
-            <a:extLst>
-              <a:ext uri="{28A0092B-C50C-407E-A947-70E740481C1C}">
-                <a14:useLocalDpi xmlns:a14="http://schemas.microsoft.com/office/drawing/2010/main" val="0"/>
-              </a:ext>
-            </a:extLst>
-          </a:blip>
-          <a:srcRect/>
+          <a:blip r:embed="rId2"/>
           <a:stretch>
             <a:fillRect/>
           </a:stretch>
         </p:blipFill>
-        <p:spPr bwMode="auto">
+        <p:spPr>
           <a:xfrm>
-            <a:off x="2021370" y="76198"/>
-            <a:ext cx="5065230" cy="5008133"/>
+            <a:off x="1981200" y="76200"/>
+            <a:ext cx="5105399" cy="5018070"/>
           </a:xfrm>
           <a:prstGeom prst="rect">
             <a:avLst/>
           </a:prstGeom>
-          <a:noFill/>
-          <a:ln>
-            <a:noFill/>
-          </a:ln>
-          <a:extLst>
-            <a:ext uri="{909E8E84-426E-40DD-AFC4-6F175D3DCCD1}">
-              <a14:hiddenFill xmlns:a14="http://schemas.microsoft.com/office/drawing/2010/main">
-                <a:solidFill>
-                  <a:schemeClr val="accent1"/>
-                </a:solidFill>
-              </a14:hiddenFill>
-            </a:ext>
-            <a:ext uri="{91240B29-F687-4F45-9708-019B960494DF}">
-              <a14:hiddenLine xmlns:a14="http://schemas.microsoft.com/office/drawing/2010/main" w="9525">
-                <a:solidFill>
-                  <a:schemeClr val="tx1"/>
-                </a:solidFill>
-                <a:miter lim="800000"/>
-                <a:headEnd/>
-                <a:tailEnd/>
-              </a14:hiddenLine>
-            </a:ext>
-          </a:extLst>
         </p:spPr>
       </p:pic>
       <p:sp>
@@ -8409,6 +8366,142 @@
     <p:extLst>
       <p:ext uri="{BB962C8B-B14F-4D97-AF65-F5344CB8AC3E}">
         <p14:creationId xmlns:p14="http://schemas.microsoft.com/office/powerpoint/2010/main" val="591706659"/>
+      </p:ext>
+    </p:extLst>
+  </p:cSld>
+  <p:clrMapOvr>
+    <a:masterClrMapping/>
+  </p:clrMapOvr>
+</p:sld>
+</file>
+
+<file path=ppt/slides/slide8.xml><?xml version="1.0" encoding="utf-8"?>
+<p:sld xmlns:a="http://schemas.openxmlformats.org/drawingml/2006/main" xmlns:r="http://schemas.openxmlformats.org/officeDocument/2006/relationships" xmlns:p="http://schemas.openxmlformats.org/presentationml/2006/main">
+  <p:cSld>
+    <p:spTree>
+      <p:nvGrpSpPr>
+        <p:cNvPr id="1" name=""/>
+        <p:cNvGrpSpPr/>
+        <p:nvPr/>
+      </p:nvGrpSpPr>
+      <p:grpSpPr>
+        <a:xfrm>
+          <a:off x="0" y="0"/>
+          <a:ext cx="0" cy="0"/>
+          <a:chOff x="0" y="0"/>
+          <a:chExt cx="0" cy="0"/>
+        </a:xfrm>
+      </p:grpSpPr>
+      <p:sp>
+        <p:nvSpPr>
+          <p:cNvPr id="2" name="TextBox 1"/>
+          <p:cNvSpPr txBox="1"/>
+          <p:nvPr/>
+        </p:nvSpPr>
+        <p:spPr>
+          <a:xfrm>
+            <a:off x="0" y="1706940"/>
+            <a:ext cx="9144000" cy="1569660"/>
+          </a:xfrm>
+          <a:prstGeom prst="rect">
+            <a:avLst/>
+          </a:prstGeom>
+          <a:noFill/>
+        </p:spPr>
+        <p:txBody>
+          <a:bodyPr wrap="square" rtlCol="0">
+            <a:spAutoFit/>
+          </a:bodyPr>
+          <a:lstStyle/>
+          <a:p>
+            <a:pPr algn="ctr"/>
+            <a:r>
+              <a:rPr lang="en-US" sz="9600" dirty="0" smtClean="0">
+                <a:latin typeface="Baskervald ADF Std" pitchFamily="18" charset="0"/>
+              </a:rPr>
+              <a:t>Dataset Creation</a:t>
+            </a:r>
+            <a:endParaRPr lang="en-US" sz="8800" dirty="0">
+              <a:latin typeface="Baskervald ADF Std" pitchFamily="18" charset="0"/>
+            </a:endParaRPr>
+          </a:p>
+        </p:txBody>
+      </p:sp>
+    </p:spTree>
+    <p:extLst>
+      <p:ext uri="{BB962C8B-B14F-4D97-AF65-F5344CB8AC3E}">
+        <p14:creationId xmlns:p14="http://schemas.microsoft.com/office/powerpoint/2010/main" val="227577481"/>
+      </p:ext>
+    </p:extLst>
+  </p:cSld>
+  <p:clrMapOvr>
+    <a:masterClrMapping/>
+  </p:clrMapOvr>
+</p:sld>
+</file>
+
+<file path=ppt/slides/slide9.xml><?xml version="1.0" encoding="utf-8"?>
+<p:sld xmlns:a="http://schemas.openxmlformats.org/drawingml/2006/main" xmlns:r="http://schemas.openxmlformats.org/officeDocument/2006/relationships" xmlns:p="http://schemas.openxmlformats.org/presentationml/2006/main">
+  <p:cSld>
+    <p:spTree>
+      <p:nvGrpSpPr>
+        <p:cNvPr id="1" name=""/>
+        <p:cNvGrpSpPr/>
+        <p:nvPr/>
+      </p:nvGrpSpPr>
+      <p:grpSpPr>
+        <a:xfrm>
+          <a:off x="0" y="0"/>
+          <a:ext cx="0" cy="0"/>
+          <a:chOff x="0" y="0"/>
+          <a:chExt cx="0" cy="0"/>
+        </a:xfrm>
+      </p:grpSpPr>
+      <p:sp>
+        <p:nvSpPr>
+          <p:cNvPr id="2" name="TextBox 1"/>
+          <p:cNvSpPr txBox="1"/>
+          <p:nvPr/>
+        </p:nvSpPr>
+        <p:spPr>
+          <a:xfrm>
+            <a:off x="0" y="1706940"/>
+            <a:ext cx="9144000" cy="3046988"/>
+          </a:xfrm>
+          <a:prstGeom prst="rect">
+            <a:avLst/>
+          </a:prstGeom>
+          <a:noFill/>
+        </p:spPr>
+        <p:txBody>
+          <a:bodyPr wrap="square" rtlCol="0">
+            <a:spAutoFit/>
+          </a:bodyPr>
+          <a:lstStyle/>
+          <a:p>
+            <a:pPr algn="ctr"/>
+            <a:r>
+              <a:rPr lang="en-US" sz="9600" dirty="0" smtClean="0">
+                <a:latin typeface="Baskervald ADF Std" pitchFamily="18" charset="0"/>
+              </a:rPr>
+              <a:t>Real-time</a:t>
+            </a:r>
+            <a:r>
+              <a:rPr lang="en-US" sz="9600" dirty="0" smtClean="0">
+                <a:latin typeface="Baskervald ADF Std" pitchFamily="18" charset="0"/>
+              </a:rPr>
+              <a:t> Pose Recovery</a:t>
+            </a:r>
+            <a:endParaRPr lang="en-US" sz="8800" dirty="0">
+              <a:latin typeface="Baskervald ADF Std" pitchFamily="18" charset="0"/>
+            </a:endParaRPr>
+          </a:p>
+        </p:txBody>
+      </p:sp>
+    </p:spTree>
+    <p:extLst>
+      <p:ext uri="{BB962C8B-B14F-4D97-AF65-F5344CB8AC3E}">
+        <p14:creationId xmlns:p14="http://schemas.microsoft.com/office/powerpoint/2010/main" val="317150048"/>
       </p:ext>
     </p:extLst>
   </p:cSld>

</xml_diff>

<commit_message>
added final movie slides using Mac OS X baskervile font.
</commit_message>
<xml_diff>
--- a/TOG_Paper/video_stuff/movie_slides_4_3.pptx
+++ b/TOG_Paper/video_stuff/movie_slides_4_3.pptx
@@ -6,14 +6,15 @@
   </p:sldMasterIdLst>
   <p:sldIdLst>
     <p:sldId id="256" r:id="rId2"/>
-    <p:sldId id="257" r:id="rId3"/>
-    <p:sldId id="258" r:id="rId4"/>
-    <p:sldId id="259" r:id="rId5"/>
-    <p:sldId id="260" r:id="rId6"/>
-    <p:sldId id="261" r:id="rId7"/>
-    <p:sldId id="262" r:id="rId8"/>
-    <p:sldId id="263" r:id="rId9"/>
-    <p:sldId id="264" r:id="rId10"/>
+    <p:sldId id="265" r:id="rId3"/>
+    <p:sldId id="257" r:id="rId4"/>
+    <p:sldId id="258" r:id="rId5"/>
+    <p:sldId id="259" r:id="rId6"/>
+    <p:sldId id="260" r:id="rId7"/>
+    <p:sldId id="261" r:id="rId8"/>
+    <p:sldId id="262" r:id="rId9"/>
+    <p:sldId id="263" r:id="rId10"/>
+    <p:sldId id="264" r:id="rId11"/>
   </p:sldIdLst>
   <p:sldSz cx="9144000" cy="6858000" type="screen4x3"/>
   <p:notesSz cx="6858000" cy="9144000"/>
@@ -297,7 +298,7 @@
             <a:fld id="{1D8BD707-D9CF-40AE-B4C6-C98DA3205C09}" type="datetimeFigureOut">
               <a:rPr lang="en-US" smtClean="0"/>
               <a:pPr/>
-              <a:t>7/15/13</a:t>
+              <a:t>7/18/13</a:t>
             </a:fld>
             <a:endParaRPr lang="en-US"/>
           </a:p>
@@ -464,7 +465,7 @@
             <a:fld id="{1D8BD707-D9CF-40AE-B4C6-C98DA3205C09}" type="datetimeFigureOut">
               <a:rPr lang="en-US" smtClean="0"/>
               <a:pPr/>
-              <a:t>7/15/13</a:t>
+              <a:t>7/18/13</a:t>
             </a:fld>
             <a:endParaRPr lang="en-US"/>
           </a:p>
@@ -641,7 +642,7 @@
             <a:fld id="{1D8BD707-D9CF-40AE-B4C6-C98DA3205C09}" type="datetimeFigureOut">
               <a:rPr lang="en-US" smtClean="0"/>
               <a:pPr/>
-              <a:t>7/15/13</a:t>
+              <a:t>7/18/13</a:t>
             </a:fld>
             <a:endParaRPr lang="en-US"/>
           </a:p>
@@ -808,7 +809,7 @@
             <a:fld id="{1D8BD707-D9CF-40AE-B4C6-C98DA3205C09}" type="datetimeFigureOut">
               <a:rPr lang="en-US" smtClean="0"/>
               <a:pPr/>
-              <a:t>7/15/13</a:t>
+              <a:t>7/18/13</a:t>
             </a:fld>
             <a:endParaRPr lang="en-US"/>
           </a:p>
@@ -1051,7 +1052,7 @@
             <a:fld id="{1D8BD707-D9CF-40AE-B4C6-C98DA3205C09}" type="datetimeFigureOut">
               <a:rPr lang="en-US" smtClean="0"/>
               <a:pPr/>
-              <a:t>7/15/13</a:t>
+              <a:t>7/18/13</a:t>
             </a:fld>
             <a:endParaRPr lang="en-US"/>
           </a:p>
@@ -1336,7 +1337,7 @@
             <a:fld id="{1D8BD707-D9CF-40AE-B4C6-C98DA3205C09}" type="datetimeFigureOut">
               <a:rPr lang="en-US" smtClean="0"/>
               <a:pPr/>
-              <a:t>7/15/13</a:t>
+              <a:t>7/18/13</a:t>
             </a:fld>
             <a:endParaRPr lang="en-US"/>
           </a:p>
@@ -1755,7 +1756,7 @@
             <a:fld id="{1D8BD707-D9CF-40AE-B4C6-C98DA3205C09}" type="datetimeFigureOut">
               <a:rPr lang="en-US" smtClean="0"/>
               <a:pPr/>
-              <a:t>7/15/13</a:t>
+              <a:t>7/18/13</a:t>
             </a:fld>
             <a:endParaRPr lang="en-US"/>
           </a:p>
@@ -1870,7 +1871,7 @@
             <a:fld id="{1D8BD707-D9CF-40AE-B4C6-C98DA3205C09}" type="datetimeFigureOut">
               <a:rPr lang="en-US" smtClean="0"/>
               <a:pPr/>
-              <a:t>7/15/13</a:t>
+              <a:t>7/18/13</a:t>
             </a:fld>
             <a:endParaRPr lang="en-US"/>
           </a:p>
@@ -1962,7 +1963,7 @@
             <a:fld id="{1D8BD707-D9CF-40AE-B4C6-C98DA3205C09}" type="datetimeFigureOut">
               <a:rPr lang="en-US" smtClean="0"/>
               <a:pPr/>
-              <a:t>7/15/13</a:t>
+              <a:t>7/18/13</a:t>
             </a:fld>
             <a:endParaRPr lang="en-US"/>
           </a:p>
@@ -2236,7 +2237,7 @@
             <a:fld id="{1D8BD707-D9CF-40AE-B4C6-C98DA3205C09}" type="datetimeFigureOut">
               <a:rPr lang="en-US" smtClean="0"/>
               <a:pPr/>
-              <a:t>7/15/13</a:t>
+              <a:t>7/18/13</a:t>
             </a:fld>
             <a:endParaRPr lang="en-US"/>
           </a:p>
@@ -2486,7 +2487,7 @@
             <a:fld id="{1D8BD707-D9CF-40AE-B4C6-C98DA3205C09}" type="datetimeFigureOut">
               <a:rPr lang="en-US" smtClean="0"/>
               <a:pPr/>
-              <a:t>7/15/13</a:t>
+              <a:t>7/18/13</a:t>
             </a:fld>
             <a:endParaRPr lang="en-US"/>
           </a:p>
@@ -2696,7 +2697,7 @@
             <a:fld id="{1D8BD707-D9CF-40AE-B4C6-C98DA3205C09}" type="datetimeFigureOut">
               <a:rPr lang="en-US" smtClean="0"/>
               <a:pPr/>
-              <a:t>7/15/13</a:t>
+              <a:t>7/18/13</a:t>
             </a:fld>
             <a:endParaRPr lang="en-US"/>
           </a:p>
@@ -3094,23 +3095,23 @@
               <a:rPr lang="en-US" sz="3600" dirty="0" smtClean="0">
                 <a:latin typeface="Baskervald ADF Std" pitchFamily="18" charset="0"/>
               </a:rPr>
-              <a:t>Real-time Pose Recovery of Human Hands Using Convolutional Neural Networks</a:t>
-            </a:r>
-            <a:endParaRPr lang="en-US" sz="800" dirty="0" smtClean="0">
-              <a:latin typeface="Baskervald ADF Std" pitchFamily="18" charset="0"/>
-            </a:endParaRPr>
+              <a:t>Real-time Pose Recovery of Human Hands Using Convolutional Neural </a:t>
+            </a:r>
+            <a:r>
+              <a:rPr lang="en-US" sz="3600" dirty="0" smtClean="0">
+                <a:latin typeface="Baskervald ADF Std" pitchFamily="18" charset="0"/>
+              </a:rPr>
+              <a:t>Networks</a:t>
+            </a:r>
           </a:p>
           <a:p>
             <a:pPr algn="ctr"/>
             <a:r>
-              <a:rPr lang="en-US" sz="800" dirty="0">
+              <a:rPr lang="en-US" sz="800" dirty="0" smtClean="0">
                 <a:latin typeface="Baskervald ADF Std" pitchFamily="18" charset="0"/>
               </a:rPr>
               <a:t> </a:t>
             </a:r>
-            <a:endParaRPr lang="en-US" sz="700" dirty="0" smtClean="0">
-              <a:latin typeface="Baskervald ADF Std" pitchFamily="18" charset="0"/>
-            </a:endParaRPr>
           </a:p>
           <a:p>
             <a:pPr algn="ctr"/>
@@ -3142,6 +3143,71 @@
     <p:extLst>
       <p:ext uri="{BB962C8B-B14F-4D97-AF65-F5344CB8AC3E}">
         <p14:creationId xmlns:p14="http://schemas.microsoft.com/office/powerpoint/2010/main" val="3350889309"/>
+      </p:ext>
+    </p:extLst>
+  </p:cSld>
+  <p:clrMapOvr>
+    <a:masterClrMapping/>
+  </p:clrMapOvr>
+</p:sld>
+</file>
+
+<file path=ppt/slides/slide10.xml><?xml version="1.0" encoding="utf-8"?>
+<p:sld xmlns:a="http://schemas.openxmlformats.org/drawingml/2006/main" xmlns:r="http://schemas.openxmlformats.org/officeDocument/2006/relationships" xmlns:p="http://schemas.openxmlformats.org/presentationml/2006/main">
+  <p:cSld>
+    <p:spTree>
+      <p:nvGrpSpPr>
+        <p:cNvPr id="1" name=""/>
+        <p:cNvGrpSpPr/>
+        <p:nvPr/>
+      </p:nvGrpSpPr>
+      <p:grpSpPr>
+        <a:xfrm>
+          <a:off x="0" y="0"/>
+          <a:ext cx="0" cy="0"/>
+          <a:chOff x="0" y="0"/>
+          <a:chExt cx="0" cy="0"/>
+        </a:xfrm>
+      </p:grpSpPr>
+      <p:sp>
+        <p:nvSpPr>
+          <p:cNvPr id="2" name="TextBox 1"/>
+          <p:cNvSpPr txBox="1"/>
+          <p:nvPr/>
+        </p:nvSpPr>
+        <p:spPr>
+          <a:xfrm>
+            <a:off x="0" y="1706940"/>
+            <a:ext cx="9144000" cy="3046988"/>
+          </a:xfrm>
+          <a:prstGeom prst="rect">
+            <a:avLst/>
+          </a:prstGeom>
+          <a:noFill/>
+        </p:spPr>
+        <p:txBody>
+          <a:bodyPr wrap="square" rtlCol="0">
+            <a:spAutoFit/>
+          </a:bodyPr>
+          <a:lstStyle/>
+          <a:p>
+            <a:pPr algn="ctr"/>
+            <a:r>
+              <a:rPr lang="en-US" sz="9600" dirty="0" smtClean="0">
+                <a:latin typeface="Baskervald ADF Std" pitchFamily="18" charset="0"/>
+              </a:rPr>
+              <a:t>Real-time Pose Recovery</a:t>
+            </a:r>
+            <a:endParaRPr lang="en-US" sz="8800" dirty="0">
+              <a:latin typeface="Baskervald ADF Std" pitchFamily="18" charset="0"/>
+            </a:endParaRPr>
+          </a:p>
+        </p:txBody>
+      </p:sp>
+    </p:spTree>
+    <p:extLst>
+      <p:ext uri="{BB962C8B-B14F-4D97-AF65-F5344CB8AC3E}">
+        <p14:creationId xmlns:p14="http://schemas.microsoft.com/office/powerpoint/2010/main" val="317150048"/>
       </p:ext>
     </p:extLst>
   </p:cSld>
@@ -3170,6 +3236,74 @@
       </p:grpSpPr>
       <p:sp>
         <p:nvSpPr>
+          <p:cNvPr id="4" name="TextBox 3"/>
+          <p:cNvSpPr txBox="1"/>
+          <p:nvPr/>
+        </p:nvSpPr>
+        <p:spPr>
+          <a:xfrm>
+            <a:off x="0" y="2076271"/>
+            <a:ext cx="9144000" cy="1200329"/>
+          </a:xfrm>
+          <a:prstGeom prst="rect">
+            <a:avLst/>
+          </a:prstGeom>
+          <a:noFill/>
+        </p:spPr>
+        <p:txBody>
+          <a:bodyPr wrap="square" rtlCol="0">
+            <a:spAutoFit/>
+          </a:bodyPr>
+          <a:lstStyle/>
+          <a:p>
+            <a:pPr algn="ctr"/>
+            <a:r>
+              <a:rPr lang="en-US" sz="3600" dirty="0" smtClean="0">
+                <a:latin typeface="Baskervald ADF Std" pitchFamily="18" charset="0"/>
+              </a:rPr>
+              <a:t>Real-time Pose Recovery of Human Hands Using Convolutional Neural </a:t>
+            </a:r>
+            <a:r>
+              <a:rPr lang="en-US" sz="3600" dirty="0" smtClean="0">
+                <a:latin typeface="Baskervald ADF Std" pitchFamily="18" charset="0"/>
+              </a:rPr>
+              <a:t>Networks</a:t>
+            </a:r>
+          </a:p>
+        </p:txBody>
+      </p:sp>
+    </p:spTree>
+    <p:extLst>
+      <p:ext uri="{BB962C8B-B14F-4D97-AF65-F5344CB8AC3E}">
+        <p14:creationId xmlns:p14="http://schemas.microsoft.com/office/powerpoint/2010/main" val="2683758994"/>
+      </p:ext>
+    </p:extLst>
+  </p:cSld>
+  <p:clrMapOvr>
+    <a:masterClrMapping/>
+  </p:clrMapOvr>
+</p:sld>
+</file>
+
+<file path=ppt/slides/slide3.xml><?xml version="1.0" encoding="utf-8"?>
+<p:sld xmlns:a="http://schemas.openxmlformats.org/drawingml/2006/main" xmlns:r="http://schemas.openxmlformats.org/officeDocument/2006/relationships" xmlns:p="http://schemas.openxmlformats.org/presentationml/2006/main">
+  <p:cSld>
+    <p:spTree>
+      <p:nvGrpSpPr>
+        <p:cNvPr id="1" name=""/>
+        <p:cNvGrpSpPr/>
+        <p:nvPr/>
+      </p:nvGrpSpPr>
+      <p:grpSpPr>
+        <a:xfrm>
+          <a:off x="0" y="0"/>
+          <a:ext cx="0" cy="0"/>
+          <a:chOff x="0" y="0"/>
+          <a:chExt cx="0" cy="0"/>
+        </a:xfrm>
+      </p:grpSpPr>
+      <p:sp>
+        <p:nvSpPr>
           <p:cNvPr id="2" name="Rectangle 1"/>
           <p:cNvSpPr/>
           <p:nvPr/>
@@ -3215,7 +3349,8 @@
                 <a:solidFill>
                   <a:schemeClr val="tx1"/>
                 </a:solidFill>
-                <a:latin typeface="Baskervald ADF Std" pitchFamily="18" charset="0"/>
+                <a:latin typeface="Baskerville"/>
+                <a:cs typeface="Baskerville"/>
               </a:rPr>
               <a:t>Offline Database Generation</a:t>
             </a:r>
@@ -3223,7 +3358,8 @@
               <a:solidFill>
                 <a:schemeClr val="tx1"/>
               </a:solidFill>
-              <a:latin typeface="Baskervald ADF Std" pitchFamily="18" charset="0"/>
+              <a:latin typeface="Baskerville"/>
+              <a:cs typeface="Baskerville"/>
             </a:endParaRPr>
           </a:p>
         </p:txBody>
@@ -3275,7 +3411,8 @@
                 <a:solidFill>
                   <a:schemeClr val="tx1"/>
                 </a:solidFill>
-                <a:latin typeface="Baskervald ADF Std" pitchFamily="18" charset="0"/>
+                <a:latin typeface="Baskerville"/>
+                <a:cs typeface="Baskerville"/>
               </a:rPr>
               <a:t>Neural Network Feature Extraction</a:t>
             </a:r>
@@ -3283,7 +3420,8 @@
               <a:solidFill>
                 <a:schemeClr val="tx1"/>
               </a:solidFill>
-              <a:latin typeface="Baskervald ADF Std" pitchFamily="18" charset="0"/>
+              <a:latin typeface="Baskerville"/>
+              <a:cs typeface="Baskerville"/>
             </a:endParaRPr>
           </a:p>
         </p:txBody>
@@ -3335,7 +3473,8 @@
                 <a:solidFill>
                   <a:schemeClr val="tx1"/>
                 </a:solidFill>
-                <a:latin typeface="Baskervald ADF Std" pitchFamily="18" charset="0"/>
+                <a:latin typeface="Baskerville"/>
+                <a:cs typeface="Baskerville"/>
               </a:rPr>
               <a:t>RDF Image </a:t>
             </a:r>
@@ -3344,7 +3483,8 @@
                 <a:solidFill>
                   <a:schemeClr val="tx1"/>
                 </a:solidFill>
-                <a:latin typeface="Baskervald ADF Std" pitchFamily="18" charset="0"/>
+                <a:latin typeface="Baskerville"/>
+                <a:cs typeface="Baskerville"/>
               </a:rPr>
               <a:t>S</a:t>
             </a:r>
@@ -3353,7 +3493,8 @@
                 <a:solidFill>
                   <a:schemeClr val="tx1"/>
                 </a:solidFill>
-                <a:latin typeface="Baskervald ADF Std" pitchFamily="18" charset="0"/>
+                <a:latin typeface="Baskerville"/>
+                <a:cs typeface="Baskerville"/>
               </a:rPr>
               <a:t>egmentation</a:t>
             </a:r>
@@ -3361,7 +3502,8 @@
               <a:solidFill>
                 <a:schemeClr val="tx1"/>
               </a:solidFill>
-              <a:latin typeface="Baskervald ADF Std" pitchFamily="18" charset="0"/>
+              <a:latin typeface="Baskerville"/>
+              <a:cs typeface="Baskerville"/>
             </a:endParaRPr>
           </a:p>
         </p:txBody>
@@ -3492,7 +3634,8 @@
                 <a:solidFill>
                   <a:schemeClr val="tx1"/>
                 </a:solidFill>
-                <a:latin typeface="Baskervald ADF Std" pitchFamily="18" charset="0"/>
+                <a:latin typeface="Baskerville"/>
+                <a:cs typeface="Baskerville"/>
               </a:rPr>
               <a:t>Real-Time Pose Recovery</a:t>
             </a:r>
@@ -3500,7 +3643,8 @@
               <a:solidFill>
                 <a:schemeClr val="tx1"/>
               </a:solidFill>
-              <a:latin typeface="Baskervald ADF Std" pitchFamily="18" charset="0"/>
+              <a:latin typeface="Baskerville"/>
+              <a:cs typeface="Baskerville"/>
             </a:endParaRPr>
           </a:p>
         </p:txBody>
@@ -3611,7 +3755,7 @@
 </p:sld>
 </file>
 
-<file path=ppt/slides/slide3.xml><?xml version="1.0" encoding="utf-8"?>
+<file path=ppt/slides/slide4.xml><?xml version="1.0" encoding="utf-8"?>
 <p:sld xmlns:a="http://schemas.openxmlformats.org/drawingml/2006/main" xmlns:r="http://schemas.openxmlformats.org/officeDocument/2006/relationships" xmlns:p="http://schemas.openxmlformats.org/presentationml/2006/main">
   <p:cSld>
     <p:spTree>
@@ -3720,7 +3864,8 @@
                 <a:solidFill>
                   <a:schemeClr val="tx1"/>
                 </a:solidFill>
-                <a:latin typeface="Baskervald ADF Std" pitchFamily="18" charset="0"/>
+                <a:latin typeface="Baskerville"/>
+                <a:cs typeface="Baskerville"/>
               </a:rPr>
               <a:t>Offline Database Generation</a:t>
             </a:r>
@@ -3728,7 +3873,8 @@
               <a:solidFill>
                 <a:schemeClr val="tx1"/>
               </a:solidFill>
-              <a:latin typeface="Baskervald ADF Std" pitchFamily="18" charset="0"/>
+              <a:latin typeface="Baskerville"/>
+              <a:cs typeface="Baskerville"/>
             </a:endParaRPr>
           </a:p>
         </p:txBody>
@@ -3780,7 +3926,8 @@
                 <a:solidFill>
                   <a:schemeClr val="tx1"/>
                 </a:solidFill>
-                <a:latin typeface="Baskervald ADF Std" pitchFamily="18" charset="0"/>
+                <a:latin typeface="Baskerville"/>
+                <a:cs typeface="Baskerville"/>
               </a:rPr>
               <a:t>Neural Network Feature Extraction</a:t>
             </a:r>
@@ -3788,7 +3935,8 @@
               <a:solidFill>
                 <a:schemeClr val="tx1"/>
               </a:solidFill>
-              <a:latin typeface="Baskervald ADF Std" pitchFamily="18" charset="0"/>
+              <a:latin typeface="Baskerville"/>
+              <a:cs typeface="Baskerville"/>
             </a:endParaRPr>
           </a:p>
         </p:txBody>
@@ -3840,7 +3988,8 @@
                 <a:solidFill>
                   <a:srgbClr val="FF0000"/>
                 </a:solidFill>
-                <a:latin typeface="Baskervald ADF Std" pitchFamily="18" charset="0"/>
+                <a:latin typeface="Baskerville"/>
+                <a:cs typeface="Baskerville"/>
               </a:rPr>
               <a:t>RDF Image </a:t>
             </a:r>
@@ -3849,7 +3998,8 @@
                 <a:solidFill>
                   <a:srgbClr val="FF0000"/>
                 </a:solidFill>
-                <a:latin typeface="Baskervald ADF Std" pitchFamily="18" charset="0"/>
+                <a:latin typeface="Baskerville"/>
+                <a:cs typeface="Baskerville"/>
               </a:rPr>
               <a:t>S</a:t>
             </a:r>
@@ -3858,7 +4008,8 @@
                 <a:solidFill>
                   <a:srgbClr val="FF0000"/>
                 </a:solidFill>
-                <a:latin typeface="Baskervald ADF Std" pitchFamily="18" charset="0"/>
+                <a:latin typeface="Baskerville"/>
+                <a:cs typeface="Baskerville"/>
               </a:rPr>
               <a:t>egmentation</a:t>
             </a:r>
@@ -3866,7 +4017,8 @@
               <a:solidFill>
                 <a:srgbClr val="FF0000"/>
               </a:solidFill>
-              <a:latin typeface="Baskervald ADF Std" pitchFamily="18" charset="0"/>
+              <a:latin typeface="Baskerville"/>
+              <a:cs typeface="Baskerville"/>
             </a:endParaRPr>
           </a:p>
         </p:txBody>
@@ -3997,7 +4149,8 @@
                 <a:solidFill>
                   <a:schemeClr val="tx1"/>
                 </a:solidFill>
-                <a:latin typeface="Baskervald ADF Std" pitchFamily="18" charset="0"/>
+                <a:latin typeface="Baskerville"/>
+                <a:cs typeface="Baskerville"/>
               </a:rPr>
               <a:t>Real-Time Pose Recovery</a:t>
             </a:r>
@@ -4005,7 +4158,8 @@
               <a:solidFill>
                 <a:schemeClr val="tx1"/>
               </a:solidFill>
-              <a:latin typeface="Baskervald ADF Std" pitchFamily="18" charset="0"/>
+              <a:latin typeface="Baskerville"/>
+              <a:cs typeface="Baskerville"/>
             </a:endParaRPr>
           </a:p>
         </p:txBody>
@@ -4062,7 +4216,7 @@
 </p:sld>
 </file>
 
-<file path=ppt/slides/slide4.xml><?xml version="1.0" encoding="utf-8"?>
+<file path=ppt/slides/slide5.xml><?xml version="1.0" encoding="utf-8"?>
 <p:sld xmlns:a="http://schemas.openxmlformats.org/drawingml/2006/main" xmlns:r="http://schemas.openxmlformats.org/officeDocument/2006/relationships" xmlns:p="http://schemas.openxmlformats.org/presentationml/2006/main">
   <p:cSld>
     <p:spTree>
@@ -4188,7 +4342,8 @@
                 <a:solidFill>
                   <a:srgbClr val="FF0000"/>
                 </a:solidFill>
-                <a:latin typeface="Baskervald ADF Std" pitchFamily="18" charset="0"/>
+                <a:latin typeface="Baskerville"/>
+                <a:cs typeface="Baskerville"/>
               </a:rPr>
               <a:t>Offline Database Generation</a:t>
             </a:r>
@@ -4196,7 +4351,8 @@
               <a:solidFill>
                 <a:srgbClr val="FF0000"/>
               </a:solidFill>
-              <a:latin typeface="Baskervald ADF Std" pitchFamily="18" charset="0"/>
+              <a:latin typeface="Baskerville"/>
+              <a:cs typeface="Baskerville"/>
             </a:endParaRPr>
           </a:p>
         </p:txBody>
@@ -4248,7 +4404,8 @@
                 <a:solidFill>
                   <a:schemeClr val="tx1"/>
                 </a:solidFill>
-                <a:latin typeface="Baskervald ADF Std" pitchFamily="18" charset="0"/>
+                <a:latin typeface="Baskerville"/>
+                <a:cs typeface="Baskerville"/>
               </a:rPr>
               <a:t>Neural Network Feature Extraction</a:t>
             </a:r>
@@ -4256,7 +4413,8 @@
               <a:solidFill>
                 <a:schemeClr val="tx1"/>
               </a:solidFill>
-              <a:latin typeface="Baskervald ADF Std" pitchFamily="18" charset="0"/>
+              <a:latin typeface="Baskerville"/>
+              <a:cs typeface="Baskerville"/>
             </a:endParaRPr>
           </a:p>
         </p:txBody>
@@ -4308,7 +4466,8 @@
                 <a:solidFill>
                   <a:schemeClr val="tx1"/>
                 </a:solidFill>
-                <a:latin typeface="Baskervald ADF Std" pitchFamily="18" charset="0"/>
+                <a:latin typeface="Baskerville"/>
+                <a:cs typeface="Baskerville"/>
               </a:rPr>
               <a:t>RDF Image </a:t>
             </a:r>
@@ -4317,7 +4476,8 @@
                 <a:solidFill>
                   <a:schemeClr val="tx1"/>
                 </a:solidFill>
-                <a:latin typeface="Baskervald ADF Std" pitchFamily="18" charset="0"/>
+                <a:latin typeface="Baskerville"/>
+                <a:cs typeface="Baskerville"/>
               </a:rPr>
               <a:t>S</a:t>
             </a:r>
@@ -4326,7 +4486,8 @@
                 <a:solidFill>
                   <a:schemeClr val="tx1"/>
                 </a:solidFill>
-                <a:latin typeface="Baskervald ADF Std" pitchFamily="18" charset="0"/>
+                <a:latin typeface="Baskerville"/>
+                <a:cs typeface="Baskerville"/>
               </a:rPr>
               <a:t>egmentation</a:t>
             </a:r>
@@ -4334,7 +4495,8 @@
               <a:solidFill>
                 <a:schemeClr val="tx1"/>
               </a:solidFill>
-              <a:latin typeface="Baskervald ADF Std" pitchFamily="18" charset="0"/>
+              <a:latin typeface="Baskerville"/>
+              <a:cs typeface="Baskerville"/>
             </a:endParaRPr>
           </a:p>
         </p:txBody>
@@ -4465,7 +4627,8 @@
                 <a:solidFill>
                   <a:schemeClr val="tx1"/>
                 </a:solidFill>
-                <a:latin typeface="Baskervald ADF Std" pitchFamily="18" charset="0"/>
+                <a:latin typeface="Baskerville"/>
+                <a:cs typeface="Baskerville"/>
               </a:rPr>
               <a:t>Real-Time Pose Recovery</a:t>
             </a:r>
@@ -4473,7 +4636,8 @@
               <a:solidFill>
                 <a:schemeClr val="tx1"/>
               </a:solidFill>
-              <a:latin typeface="Baskervald ADF Std" pitchFamily="18" charset="0"/>
+              <a:latin typeface="Baskerville"/>
+              <a:cs typeface="Baskerville"/>
             </a:endParaRPr>
           </a:p>
         </p:txBody>
@@ -4530,7 +4694,7 @@
 </p:sld>
 </file>
 
-<file path=ppt/slides/slide5.xml><?xml version="1.0" encoding="utf-8"?>
+<file path=ppt/slides/slide6.xml><?xml version="1.0" encoding="utf-8"?>
 <p:sld xmlns:a="http://schemas.openxmlformats.org/drawingml/2006/main" xmlns:r="http://schemas.openxmlformats.org/officeDocument/2006/relationships" xmlns:p="http://schemas.openxmlformats.org/presentationml/2006/main">
   <p:cSld>
     <p:spTree>
@@ -4594,7 +4758,8 @@
                 <a:solidFill>
                   <a:schemeClr val="tx1"/>
                 </a:solidFill>
-                <a:latin typeface="Baskervald ADF Std" pitchFamily="18" charset="0"/>
+                <a:latin typeface="Baskerville"/>
+                <a:cs typeface="Baskerville"/>
               </a:rPr>
               <a:t>Offline Database Generation</a:t>
             </a:r>
@@ -4602,7 +4767,8 @@
               <a:solidFill>
                 <a:schemeClr val="tx1"/>
               </a:solidFill>
-              <a:latin typeface="Baskervald ADF Std" pitchFamily="18" charset="0"/>
+              <a:latin typeface="Baskerville"/>
+              <a:cs typeface="Baskerville"/>
             </a:endParaRPr>
           </a:p>
         </p:txBody>
@@ -4654,7 +4820,8 @@
                 <a:solidFill>
                   <a:srgbClr val="FF0000"/>
                 </a:solidFill>
-                <a:latin typeface="Baskervald ADF Std" pitchFamily="18" charset="0"/>
+                <a:latin typeface="Baskerville"/>
+                <a:cs typeface="Baskerville"/>
               </a:rPr>
               <a:t>Neural Network Feature Extraction</a:t>
             </a:r>
@@ -4662,7 +4829,8 @@
               <a:solidFill>
                 <a:srgbClr val="FF0000"/>
               </a:solidFill>
-              <a:latin typeface="Baskervald ADF Std" pitchFamily="18" charset="0"/>
+              <a:latin typeface="Baskerville"/>
+              <a:cs typeface="Baskerville"/>
             </a:endParaRPr>
           </a:p>
         </p:txBody>
@@ -4714,7 +4882,8 @@
                 <a:solidFill>
                   <a:schemeClr val="tx1"/>
                 </a:solidFill>
-                <a:latin typeface="Baskervald ADF Std" pitchFamily="18" charset="0"/>
+                <a:latin typeface="Baskerville"/>
+                <a:cs typeface="Baskerville"/>
               </a:rPr>
               <a:t>RDF Image </a:t>
             </a:r>
@@ -4723,7 +4892,8 @@
                 <a:solidFill>
                   <a:schemeClr val="tx1"/>
                 </a:solidFill>
-                <a:latin typeface="Baskervald ADF Std" pitchFamily="18" charset="0"/>
+                <a:latin typeface="Baskerville"/>
+                <a:cs typeface="Baskerville"/>
               </a:rPr>
               <a:t>S</a:t>
             </a:r>
@@ -4732,7 +4902,8 @@
                 <a:solidFill>
                   <a:schemeClr val="tx1"/>
                 </a:solidFill>
-                <a:latin typeface="Baskervald ADF Std" pitchFamily="18" charset="0"/>
+                <a:latin typeface="Baskerville"/>
+                <a:cs typeface="Baskerville"/>
               </a:rPr>
               <a:t>egmentation</a:t>
             </a:r>
@@ -4740,7 +4911,8 @@
               <a:solidFill>
                 <a:schemeClr val="tx1"/>
               </a:solidFill>
-              <a:latin typeface="Baskervald ADF Std" pitchFamily="18" charset="0"/>
+              <a:latin typeface="Baskerville"/>
+              <a:cs typeface="Baskerville"/>
             </a:endParaRPr>
           </a:p>
         </p:txBody>
@@ -4871,7 +5043,8 @@
                 <a:solidFill>
                   <a:schemeClr val="tx1"/>
                 </a:solidFill>
-                <a:latin typeface="Baskervald ADF Std" pitchFamily="18" charset="0"/>
+                <a:latin typeface="Baskerville"/>
+                <a:cs typeface="Baskerville"/>
               </a:rPr>
               <a:t>Real-Time Pose Recovery</a:t>
             </a:r>
@@ -4879,7 +5052,8 @@
               <a:solidFill>
                 <a:schemeClr val="tx1"/>
               </a:solidFill>
-              <a:latin typeface="Baskervald ADF Std" pitchFamily="18" charset="0"/>
+              <a:latin typeface="Baskerville"/>
+              <a:cs typeface="Baskerville"/>
             </a:endParaRPr>
           </a:p>
         </p:txBody>
@@ -5679,7 +5853,7 @@
 </p:sld>
 </file>
 
-<file path=ppt/slides/slide6.xml><?xml version="1.0" encoding="utf-8"?>
+<file path=ppt/slides/slide7.xml><?xml version="1.0" encoding="utf-8"?>
 <p:sld xmlns:a="http://schemas.openxmlformats.org/drawingml/2006/main" xmlns:r="http://schemas.openxmlformats.org/officeDocument/2006/relationships" xmlns:p="http://schemas.openxmlformats.org/presentationml/2006/main">
   <p:cSld>
     <p:spTree>
@@ -5767,7 +5941,8 @@
                 <a:solidFill>
                   <a:schemeClr val="tx1"/>
                 </a:solidFill>
-                <a:latin typeface="Baskervald ADF Std" pitchFamily="18" charset="0"/>
+                <a:latin typeface="Baskerville"/>
+                <a:cs typeface="Baskerville"/>
               </a:rPr>
               <a:t>Offline Database Generation</a:t>
             </a:r>
@@ -5775,7 +5950,8 @@
               <a:solidFill>
                 <a:schemeClr val="tx1"/>
               </a:solidFill>
-              <a:latin typeface="Baskervald ADF Std" pitchFamily="18" charset="0"/>
+              <a:latin typeface="Baskerville"/>
+              <a:cs typeface="Baskerville"/>
             </a:endParaRPr>
           </a:p>
         </p:txBody>
@@ -5827,7 +6003,8 @@
                 <a:solidFill>
                   <a:schemeClr val="tx1"/>
                 </a:solidFill>
-                <a:latin typeface="Baskervald ADF Std" pitchFamily="18" charset="0"/>
+                <a:latin typeface="Baskerville"/>
+                <a:cs typeface="Baskerville"/>
               </a:rPr>
               <a:t>Neural Network Feature Extraction</a:t>
             </a:r>
@@ -5835,7 +6012,8 @@
               <a:solidFill>
                 <a:schemeClr val="tx1"/>
               </a:solidFill>
-              <a:latin typeface="Baskervald ADF Std" pitchFamily="18" charset="0"/>
+              <a:latin typeface="Baskerville"/>
+              <a:cs typeface="Baskerville"/>
             </a:endParaRPr>
           </a:p>
         </p:txBody>
@@ -5887,7 +6065,8 @@
                 <a:solidFill>
                   <a:schemeClr val="tx1"/>
                 </a:solidFill>
-                <a:latin typeface="Baskervald ADF Std" pitchFamily="18" charset="0"/>
+                <a:latin typeface="Baskerville"/>
+                <a:cs typeface="Baskerville"/>
               </a:rPr>
               <a:t>RDF Image </a:t>
             </a:r>
@@ -5896,7 +6075,8 @@
                 <a:solidFill>
                   <a:schemeClr val="tx1"/>
                 </a:solidFill>
-                <a:latin typeface="Baskervald ADF Std" pitchFamily="18" charset="0"/>
+                <a:latin typeface="Baskerville"/>
+                <a:cs typeface="Baskerville"/>
               </a:rPr>
               <a:t>S</a:t>
             </a:r>
@@ -5905,7 +6085,8 @@
                 <a:solidFill>
                   <a:schemeClr val="tx1"/>
                 </a:solidFill>
-                <a:latin typeface="Baskervald ADF Std" pitchFamily="18" charset="0"/>
+                <a:latin typeface="Baskerville"/>
+                <a:cs typeface="Baskerville"/>
               </a:rPr>
               <a:t>egmentation</a:t>
             </a:r>
@@ -5913,7 +6094,8 @@
               <a:solidFill>
                 <a:schemeClr val="tx1"/>
               </a:solidFill>
-              <a:latin typeface="Baskervald ADF Std" pitchFamily="18" charset="0"/>
+              <a:latin typeface="Baskerville"/>
+              <a:cs typeface="Baskerville"/>
             </a:endParaRPr>
           </a:p>
         </p:txBody>
@@ -6044,7 +6226,8 @@
                 <a:solidFill>
                   <a:srgbClr val="FF0000"/>
                 </a:solidFill>
-                <a:latin typeface="Baskervald ADF Std" pitchFamily="18" charset="0"/>
+                <a:latin typeface="Baskerville"/>
+                <a:cs typeface="Baskerville"/>
               </a:rPr>
               <a:t>Real-Time Pose Recovery</a:t>
             </a:r>
@@ -6052,7 +6235,8 @@
               <a:solidFill>
                 <a:srgbClr val="FF0000"/>
               </a:solidFill>
-              <a:latin typeface="Baskervald ADF Std" pitchFamily="18" charset="0"/>
+              <a:latin typeface="Baskerville"/>
+              <a:cs typeface="Baskerville"/>
             </a:endParaRPr>
           </a:p>
         </p:txBody>
@@ -6109,7 +6293,7 @@
 </p:sld>
 </file>
 
-<file path=ppt/slides/slide7.xml><?xml version="1.0" encoding="utf-8"?>
+<file path=ppt/slides/slide8.xml><?xml version="1.0" encoding="utf-8"?>
 <p:sld xmlns:a="http://schemas.openxmlformats.org/drawingml/2006/main" xmlns:r="http://schemas.openxmlformats.org/officeDocument/2006/relationships" xmlns:p="http://schemas.openxmlformats.org/presentationml/2006/main">
   <p:cSld>
     <p:spTree>
@@ -6135,9 +6319,9 @@
         <p:grpSpPr>
           <a:xfrm>
             <a:off x="160487" y="1752600"/>
-            <a:ext cx="8907313" cy="3524250"/>
+            <a:ext cx="8872015" cy="3501294"/>
             <a:chOff x="1524000" y="1469753"/>
-            <a:chExt cx="6229100" cy="2464592"/>
+            <a:chExt cx="6204415" cy="2448538"/>
           </a:xfrm>
         </p:grpSpPr>
         <p:sp>
@@ -6190,7 +6374,8 @@
                   <a:solidFill>
                     <a:srgbClr val="FF0000"/>
                   </a:solidFill>
-                  <a:latin typeface="Baskervald ADF Std" pitchFamily="18" charset="0"/>
+                  <a:latin typeface="Baskerville"/>
+                  <a:cs typeface="Baskerville"/>
                 </a:rPr>
                 <a:t>CNN Feature Detector 1</a:t>
               </a:r>
@@ -6198,7 +6383,8 @@
                 <a:solidFill>
                   <a:schemeClr val="tx1"/>
                 </a:solidFill>
-                <a:latin typeface="Baskervald ADF Std" pitchFamily="18" charset="0"/>
+                <a:latin typeface="Baskerville"/>
+                <a:cs typeface="Baskerville"/>
               </a:endParaRPr>
             </a:p>
           </p:txBody>
@@ -6253,7 +6439,8 @@
                   <a:solidFill>
                     <a:srgbClr val="FF0000"/>
                   </a:solidFill>
-                  <a:latin typeface="Baskervald ADF Std" pitchFamily="18" charset="0"/>
+                  <a:latin typeface="Baskerville"/>
+                  <a:cs typeface="Baskerville"/>
                 </a:rPr>
                 <a:t>CNN Feature Detector 2</a:t>
               </a:r>
@@ -6261,7 +6448,8 @@
                 <a:solidFill>
                   <a:schemeClr val="tx1"/>
                 </a:solidFill>
-                <a:latin typeface="Baskervald ADF Std" pitchFamily="18" charset="0"/>
+                <a:latin typeface="Baskerville"/>
+                <a:cs typeface="Baskerville"/>
               </a:endParaRPr>
             </a:p>
           </p:txBody>
@@ -6316,7 +6504,8 @@
                   <a:solidFill>
                     <a:srgbClr val="FF0000"/>
                   </a:solidFill>
-                  <a:latin typeface="Baskervald ADF Std" pitchFamily="18" charset="0"/>
+                  <a:latin typeface="Baskerville"/>
+                  <a:cs typeface="Baskerville"/>
                 </a:rPr>
                 <a:t>CNN Feature Detector 3</a:t>
               </a:r>
@@ -6324,7 +6513,8 @@
                 <a:solidFill>
                   <a:schemeClr val="tx1"/>
                 </a:solidFill>
-                <a:latin typeface="Baskervald ADF Std" pitchFamily="18" charset="0"/>
+                <a:latin typeface="Baskerville"/>
+                <a:cs typeface="Baskerville"/>
               </a:endParaRPr>
             </a:p>
           </p:txBody>
@@ -6379,7 +6569,8 @@
                   <a:solidFill>
                     <a:srgbClr val="FF0000"/>
                   </a:solidFill>
-                  <a:latin typeface="Baskervald ADF Std" pitchFamily="18" charset="0"/>
+                  <a:latin typeface="Baskerville"/>
+                  <a:cs typeface="Baskerville"/>
                 </a:rPr>
                 <a:t>RDF Image Segmentation &amp; Preprocessing</a:t>
               </a:r>
@@ -6387,7 +6578,8 @@
                 <a:solidFill>
                   <a:schemeClr val="tx1"/>
                 </a:solidFill>
-                <a:latin typeface="Baskervald ADF Std" pitchFamily="18" charset="0"/>
+                <a:latin typeface="Baskerville"/>
+                <a:cs typeface="Baskerville"/>
               </a:endParaRPr>
             </a:p>
           </p:txBody>
@@ -6561,7 +6753,8 @@
                 <a:solidFill>
                   <a:schemeClr val="tx1"/>
                 </a:solidFill>
-                <a:latin typeface="Baskervald ADF Std" pitchFamily="18" charset="0"/>
+                <a:latin typeface="Baskerville"/>
+                <a:cs typeface="Baskerville"/>
               </a:endParaRPr>
             </a:p>
           </p:txBody>
@@ -6603,7 +6796,8 @@
             <a:p>
               <a:pPr algn="ctr"/>
               <a:endParaRPr lang="en-US" sz="2800" dirty="0">
-                <a:latin typeface="Baskervald ADF Std" pitchFamily="18" charset="0"/>
+                <a:latin typeface="Baskerville"/>
+                <a:cs typeface="Baskerville"/>
               </a:endParaRPr>
             </a:p>
           </p:txBody>
@@ -6645,7 +6839,8 @@
             <a:p>
               <a:pPr algn="ctr"/>
               <a:endParaRPr lang="en-US" sz="2800" dirty="0">
-                <a:latin typeface="Baskervald ADF Std" pitchFamily="18" charset="0"/>
+                <a:latin typeface="Baskerville"/>
+                <a:cs typeface="Baskerville"/>
               </a:endParaRPr>
             </a:p>
           </p:txBody>
@@ -6687,7 +6882,8 @@
             <a:p>
               <a:pPr algn="ctr"/>
               <a:endParaRPr lang="en-US" sz="2800" dirty="0">
-                <a:latin typeface="Baskervald ADF Std" pitchFamily="18" charset="0"/>
+                <a:latin typeface="Baskerville"/>
+                <a:cs typeface="Baskerville"/>
               </a:endParaRPr>
             </a:p>
           </p:txBody>
@@ -6729,7 +6925,8 @@
             <a:p>
               <a:pPr algn="ctr"/>
               <a:endParaRPr lang="en-US" sz="2800" dirty="0">
-                <a:latin typeface="Baskervald ADF Std" pitchFamily="18" charset="0"/>
+                <a:latin typeface="Baskerville"/>
+                <a:cs typeface="Baskerville"/>
               </a:endParaRPr>
             </a:p>
           </p:txBody>
@@ -6771,7 +6968,8 @@
             <a:p>
               <a:pPr algn="ctr"/>
               <a:endParaRPr lang="en-US" sz="2800" dirty="0">
-                <a:latin typeface="Baskervald ADF Std" pitchFamily="18" charset="0"/>
+                <a:latin typeface="Baskerville"/>
+                <a:cs typeface="Baskerville"/>
               </a:endParaRPr>
             </a:p>
           </p:txBody>
@@ -6813,7 +7011,8 @@
             <a:p>
               <a:pPr algn="ctr"/>
               <a:endParaRPr lang="en-US" sz="2800" dirty="0">
-                <a:latin typeface="Baskervald ADF Std" pitchFamily="18" charset="0"/>
+                <a:latin typeface="Baskerville"/>
+                <a:cs typeface="Baskerville"/>
               </a:endParaRPr>
             </a:p>
           </p:txBody>
@@ -6855,7 +7054,8 @@
             <a:p>
               <a:pPr algn="ctr"/>
               <a:endParaRPr lang="en-US" sz="2800" dirty="0">
-                <a:latin typeface="Baskervald ADF Std" pitchFamily="18" charset="0"/>
+                <a:latin typeface="Baskerville"/>
+                <a:cs typeface="Baskerville"/>
               </a:endParaRPr>
             </a:p>
           </p:txBody>
@@ -6897,7 +7097,8 @@
             <a:p>
               <a:pPr algn="ctr"/>
               <a:endParaRPr lang="en-US" sz="2800" dirty="0">
-                <a:latin typeface="Baskervald ADF Std" pitchFamily="18" charset="0"/>
+                <a:latin typeface="Baskerville"/>
+                <a:cs typeface="Baskerville"/>
               </a:endParaRPr>
             </a:p>
           </p:txBody>
@@ -6939,7 +7140,8 @@
             <a:p>
               <a:pPr algn="ctr"/>
               <a:endParaRPr lang="en-US" sz="2800" dirty="0">
-                <a:latin typeface="Baskervald ADF Std" pitchFamily="18" charset="0"/>
+                <a:latin typeface="Baskerville"/>
+                <a:cs typeface="Baskerville"/>
               </a:endParaRPr>
             </a:p>
           </p:txBody>
@@ -6981,7 +7183,8 @@
             <a:p>
               <a:pPr algn="ctr"/>
               <a:endParaRPr lang="en-US" sz="2800" dirty="0">
-                <a:latin typeface="Baskervald ADF Std" pitchFamily="18" charset="0"/>
+                <a:latin typeface="Baskerville"/>
+                <a:cs typeface="Baskerville"/>
               </a:endParaRPr>
             </a:p>
           </p:txBody>
@@ -7023,7 +7226,8 @@
             <a:p>
               <a:pPr algn="ctr"/>
               <a:endParaRPr lang="en-US" sz="2800" dirty="0">
-                <a:latin typeface="Baskervald ADF Std" pitchFamily="18" charset="0"/>
+                <a:latin typeface="Baskerville"/>
+                <a:cs typeface="Baskerville"/>
               </a:endParaRPr>
             </a:p>
           </p:txBody>
@@ -7065,7 +7269,8 @@
             <a:p>
               <a:pPr algn="ctr"/>
               <a:endParaRPr lang="en-US" sz="2800" dirty="0">
-                <a:latin typeface="Baskervald ADF Std" pitchFamily="18" charset="0"/>
+                <a:latin typeface="Baskerville"/>
+                <a:cs typeface="Baskerville"/>
               </a:endParaRPr>
             </a:p>
           </p:txBody>
@@ -7107,7 +7312,8 @@
             <a:p>
               <a:pPr algn="ctr"/>
               <a:endParaRPr lang="en-US" sz="2800" dirty="0">
-                <a:latin typeface="Baskervald ADF Std" pitchFamily="18" charset="0"/>
+                <a:latin typeface="Baskerville"/>
+                <a:cs typeface="Baskerville"/>
               </a:endParaRPr>
             </a:p>
           </p:txBody>
@@ -7149,7 +7355,8 @@
             <a:p>
               <a:pPr algn="ctr"/>
               <a:endParaRPr lang="en-US" sz="2800" dirty="0">
-                <a:latin typeface="Baskervald ADF Std" pitchFamily="18" charset="0"/>
+                <a:latin typeface="Baskerville"/>
+                <a:cs typeface="Baskerville"/>
               </a:endParaRPr>
             </a:p>
           </p:txBody>
@@ -7191,7 +7398,8 @@
             <a:p>
               <a:pPr algn="ctr"/>
               <a:endParaRPr lang="en-US" sz="2800" dirty="0">
-                <a:latin typeface="Baskervald ADF Std" pitchFamily="18" charset="0"/>
+                <a:latin typeface="Baskerville"/>
+                <a:cs typeface="Baskerville"/>
               </a:endParaRPr>
             </a:p>
           </p:txBody>
@@ -7233,7 +7441,8 @@
             <a:p>
               <a:pPr algn="ctr"/>
               <a:endParaRPr lang="en-US" sz="2800" dirty="0">
-                <a:latin typeface="Baskervald ADF Std" pitchFamily="18" charset="0"/>
+                <a:latin typeface="Baskerville"/>
+                <a:cs typeface="Baskerville"/>
               </a:endParaRPr>
             </a:p>
           </p:txBody>
@@ -7275,7 +7484,8 @@
             <a:p>
               <a:pPr algn="ctr"/>
               <a:endParaRPr lang="en-US" sz="2800" dirty="0">
-                <a:latin typeface="Baskervald ADF Std" pitchFamily="18" charset="0"/>
+                <a:latin typeface="Baskerville"/>
+                <a:cs typeface="Baskerville"/>
               </a:endParaRPr>
             </a:p>
           </p:txBody>
@@ -7317,7 +7527,8 @@
             <a:p>
               <a:pPr algn="ctr"/>
               <a:endParaRPr lang="en-US" sz="2800" dirty="0">
-                <a:latin typeface="Baskervald ADF Std" pitchFamily="18" charset="0"/>
+                <a:latin typeface="Baskerville"/>
+                <a:cs typeface="Baskerville"/>
               </a:endParaRPr>
             </a:p>
           </p:txBody>
@@ -7359,7 +7570,8 @@
             <a:p>
               <a:pPr algn="ctr"/>
               <a:endParaRPr lang="en-US" sz="2800" dirty="0">
-                <a:latin typeface="Baskervald ADF Std" pitchFamily="18" charset="0"/>
+                <a:latin typeface="Baskerville"/>
+                <a:cs typeface="Baskerville"/>
               </a:endParaRPr>
             </a:p>
           </p:txBody>
@@ -7401,7 +7613,8 @@
             <a:p>
               <a:pPr algn="ctr"/>
               <a:endParaRPr lang="en-US" sz="2800" dirty="0">
-                <a:latin typeface="Baskervald ADF Std" pitchFamily="18" charset="0"/>
+                <a:latin typeface="Baskerville"/>
+                <a:cs typeface="Baskerville"/>
               </a:endParaRPr>
             </a:p>
           </p:txBody>
@@ -7443,7 +7656,8 @@
             <a:p>
               <a:pPr algn="ctr"/>
               <a:endParaRPr lang="en-US" sz="2800" dirty="0">
-                <a:latin typeface="Baskervald ADF Std" pitchFamily="18" charset="0"/>
+                <a:latin typeface="Baskerville"/>
+                <a:cs typeface="Baskerville"/>
               </a:endParaRPr>
             </a:p>
           </p:txBody>
@@ -7485,7 +7699,8 @@
             <a:p>
               <a:pPr algn="ctr"/>
               <a:endParaRPr lang="en-US" sz="2800" dirty="0">
-                <a:latin typeface="Baskervald ADF Std" pitchFamily="18" charset="0"/>
+                <a:latin typeface="Baskerville"/>
+                <a:cs typeface="Baskerville"/>
               </a:endParaRPr>
             </a:p>
           </p:txBody>
@@ -7657,7 +7872,8 @@
                   <a:solidFill>
                     <a:srgbClr val="FF0000"/>
                   </a:solidFill>
-                  <a:latin typeface="Baskervald ADF Std" pitchFamily="18" charset="0"/>
+                  <a:latin typeface="Baskerville"/>
+                  <a:cs typeface="Baskerville"/>
                 </a:rPr>
                 <a:t>2 stage Neural Network</a:t>
               </a:r>
@@ -7665,7 +7881,8 @@
                 <a:solidFill>
                   <a:schemeClr val="tx1"/>
                 </a:solidFill>
-                <a:latin typeface="Baskervald ADF Std" pitchFamily="18" charset="0"/>
+                <a:latin typeface="Baskerville"/>
+                <a:cs typeface="Baskerville"/>
               </a:endParaRPr>
             </a:p>
           </p:txBody>
@@ -7759,7 +7976,8 @@
                 <a:solidFill>
                   <a:schemeClr val="tx1"/>
                 </a:solidFill>
-                <a:latin typeface="Baskervald ADF Std" pitchFamily="18" charset="0"/>
+                <a:latin typeface="Baskerville"/>
+                <a:cs typeface="Baskerville"/>
               </a:endParaRPr>
             </a:p>
           </p:txBody>
@@ -7812,8 +8030,8 @@
           </p:nvSpPr>
           <p:spPr>
             <a:xfrm>
-              <a:off x="4760701" y="3466296"/>
-              <a:ext cx="1031565" cy="468049"/>
+              <a:off x="4781442" y="3466296"/>
+              <a:ext cx="990084" cy="451995"/>
             </a:xfrm>
             <a:prstGeom prst="rect">
               <a:avLst/>
@@ -7833,7 +8051,8 @@
                   <a:solidFill>
                     <a:srgbClr val="FF0000"/>
                   </a:solidFill>
-                  <a:latin typeface="Baskervald ADF Std" pitchFamily="18" charset="0"/>
+                  <a:latin typeface="Baskerville"/>
+                  <a:cs typeface="Baskerville"/>
                 </a:rPr>
                 <a:t>c</a:t>
               </a:r>
@@ -7842,7 +8061,8 @@
                   <a:solidFill>
                     <a:srgbClr val="FF0000"/>
                   </a:solidFill>
-                  <a:latin typeface="Baskervald ADF Std" pitchFamily="18" charset="0"/>
+                  <a:latin typeface="Baskerville"/>
+                  <a:cs typeface="Baskerville"/>
                 </a:rPr>
                 <a:t>oncatenate</a:t>
               </a:r>
@@ -7856,7 +8076,8 @@
                   <a:solidFill>
                     <a:srgbClr val="FF0000"/>
                   </a:solidFill>
-                  <a:latin typeface="Baskervald ADF Std" pitchFamily="18" charset="0"/>
+                  <a:latin typeface="Baskerville"/>
+                  <a:cs typeface="Baskerville"/>
                 </a:rPr>
                 <a:t>(1D vector)</a:t>
               </a:r>
@@ -7864,7 +8085,8 @@
                 <a:solidFill>
                   <a:srgbClr val="FF0000"/>
                 </a:solidFill>
-                <a:latin typeface="Baskervald ADF Std" pitchFamily="18" charset="0"/>
+                <a:latin typeface="Baskerville"/>
+                <a:cs typeface="Baskerville"/>
               </a:endParaRPr>
             </a:p>
           </p:txBody>
@@ -7877,8 +8099,8 @@
           </p:nvSpPr>
           <p:spPr>
             <a:xfrm>
-              <a:off x="6828936" y="3466297"/>
-              <a:ext cx="924164" cy="289745"/>
+              <a:off x="6853621" y="3466297"/>
+              <a:ext cx="874794" cy="279806"/>
             </a:xfrm>
             <a:prstGeom prst="rect">
               <a:avLst/>
@@ -7898,7 +8120,8 @@
                   <a:solidFill>
                     <a:srgbClr val="FF0000"/>
                   </a:solidFill>
-                  <a:latin typeface="Baskervald ADF Std" pitchFamily="18" charset="0"/>
+                  <a:latin typeface="Baskerville"/>
+                  <a:cs typeface="Baskerville"/>
                 </a:rPr>
                 <a:t>h</a:t>
               </a:r>
@@ -7907,12 +8130,14 @@
                   <a:solidFill>
                     <a:srgbClr val="FF0000"/>
                   </a:solidFill>
-                  <a:latin typeface="Baskervald ADF Std" pitchFamily="18" charset="0"/>
+                  <a:latin typeface="Baskerville"/>
+                  <a:cs typeface="Baskerville"/>
                 </a:rPr>
                 <a:t>eat-maps</a:t>
               </a:r>
               <a:endParaRPr lang="en-US" sz="2000" dirty="0">
-                <a:latin typeface="Baskervald ADF Std" pitchFamily="18" charset="0"/>
+                <a:latin typeface="Baskerville"/>
+                <a:cs typeface="Baskerville"/>
               </a:endParaRPr>
             </a:p>
           </p:txBody>
@@ -7925,8 +8150,8 @@
           </p:nvSpPr>
           <p:spPr>
             <a:xfrm>
-              <a:off x="3083342" y="1522026"/>
-              <a:ext cx="620119" cy="289745"/>
+              <a:off x="3106510" y="1522026"/>
+              <a:ext cx="573783" cy="279806"/>
             </a:xfrm>
             <a:prstGeom prst="rect">
               <a:avLst/>
@@ -7946,7 +8171,8 @@
                   <a:solidFill>
                     <a:schemeClr val="tx2"/>
                   </a:solidFill>
-                  <a:latin typeface="Baskervald ADF Std" pitchFamily="18" charset="0"/>
+                  <a:latin typeface="Baskerville"/>
+                  <a:cs typeface="Baskerville"/>
                 </a:rPr>
                 <a:t>96x96</a:t>
               </a:r>
@@ -7954,7 +8180,8 @@
                 <a:solidFill>
                   <a:schemeClr val="tx2"/>
                 </a:solidFill>
-                <a:latin typeface="Baskervald ADF Std" pitchFamily="18" charset="0"/>
+                <a:latin typeface="Baskerville"/>
+                <a:cs typeface="Baskerville"/>
               </a:endParaRPr>
             </a:p>
           </p:txBody>
@@ -7967,8 +8194,8 @@
           </p:nvSpPr>
           <p:spPr>
             <a:xfrm>
-              <a:off x="3087984" y="2170117"/>
-              <a:ext cx="610832" cy="289745"/>
+              <a:off x="3100141" y="2170117"/>
+              <a:ext cx="586517" cy="279806"/>
             </a:xfrm>
             <a:prstGeom prst="rect">
               <a:avLst/>
@@ -7988,7 +8215,8 @@
                   <a:solidFill>
                     <a:schemeClr val="tx2"/>
                   </a:solidFill>
-                  <a:latin typeface="Baskervald ADF Std" pitchFamily="18" charset="0"/>
+                  <a:latin typeface="Baskerville"/>
+                  <a:cs typeface="Baskerville"/>
                 </a:rPr>
                 <a:t>48x48</a:t>
               </a:r>
@@ -7996,7 +8224,8 @@
                 <a:solidFill>
                   <a:schemeClr val="tx2"/>
                 </a:solidFill>
-                <a:latin typeface="Baskervald ADF Std" pitchFamily="18" charset="0"/>
+                <a:latin typeface="Baskerville"/>
+                <a:cs typeface="Baskerville"/>
               </a:endParaRPr>
             </a:p>
           </p:txBody>
@@ -8030,7 +8259,8 @@
                   <a:solidFill>
                     <a:schemeClr val="tx2"/>
                   </a:solidFill>
-                  <a:latin typeface="Baskervald ADF Std" pitchFamily="18" charset="0"/>
+                  <a:latin typeface="Baskerville"/>
+                  <a:cs typeface="Baskerville"/>
                 </a:rPr>
                 <a:t>24x24</a:t>
               </a:r>
@@ -8038,7 +8268,8 @@
                 <a:solidFill>
                   <a:schemeClr val="tx2"/>
                 </a:solidFill>
-                <a:latin typeface="Baskervald ADF Std" pitchFamily="18" charset="0"/>
+                <a:latin typeface="Baskerville"/>
+                <a:cs typeface="Baskerville"/>
               </a:endParaRPr>
             </a:p>
           </p:txBody>
@@ -8146,7 +8377,8 @@
             <a:p>
               <a:pPr algn="ctr"/>
               <a:endParaRPr lang="en-US" sz="2800" dirty="0">
-                <a:latin typeface="Baskervald ADF Std" pitchFamily="18" charset="0"/>
+                <a:latin typeface="Baskerville"/>
+                <a:cs typeface="Baskerville"/>
               </a:endParaRPr>
             </a:p>
           </p:txBody>
@@ -8188,7 +8420,8 @@
             <a:p>
               <a:pPr algn="ctr"/>
               <a:endParaRPr lang="en-US" sz="2800" dirty="0">
-                <a:latin typeface="Baskervald ADF Std" pitchFamily="18" charset="0"/>
+                <a:latin typeface="Baskerville"/>
+                <a:cs typeface="Baskerville"/>
               </a:endParaRPr>
             </a:p>
           </p:txBody>
@@ -8230,7 +8463,8 @@
             <a:p>
               <a:pPr algn="ctr"/>
               <a:endParaRPr lang="en-US" sz="2800" dirty="0">
-                <a:latin typeface="Baskervald ADF Std" pitchFamily="18" charset="0"/>
+                <a:latin typeface="Baskerville"/>
+                <a:cs typeface="Baskerville"/>
               </a:endParaRPr>
             </a:p>
           </p:txBody>
@@ -8272,7 +8506,8 @@
             <a:p>
               <a:pPr algn="ctr"/>
               <a:endParaRPr lang="en-US" sz="2800" dirty="0">
-                <a:latin typeface="Baskervald ADF Std" pitchFamily="18" charset="0"/>
+                <a:latin typeface="Baskerville"/>
+                <a:cs typeface="Baskerville"/>
               </a:endParaRPr>
             </a:p>
           </p:txBody>
@@ -8314,7 +8549,8 @@
             <a:p>
               <a:pPr algn="ctr"/>
               <a:endParaRPr lang="en-US" sz="2800" dirty="0">
-                <a:latin typeface="Baskervald ADF Std" pitchFamily="18" charset="0"/>
+                <a:latin typeface="Baskerville"/>
+                <a:cs typeface="Baskerville"/>
               </a:endParaRPr>
             </a:p>
           </p:txBody>
@@ -8356,7 +8592,8 @@
             <a:p>
               <a:pPr algn="ctr"/>
               <a:endParaRPr lang="en-US" sz="2800" dirty="0">
-                <a:latin typeface="Baskervald ADF Std" pitchFamily="18" charset="0"/>
+                <a:latin typeface="Baskerville"/>
+                <a:cs typeface="Baskerville"/>
               </a:endParaRPr>
             </a:p>
           </p:txBody>
@@ -8366,71 +8603,6 @@
     <p:extLst>
       <p:ext uri="{BB962C8B-B14F-4D97-AF65-F5344CB8AC3E}">
         <p14:creationId xmlns:p14="http://schemas.microsoft.com/office/powerpoint/2010/main" val="591706659"/>
-      </p:ext>
-    </p:extLst>
-  </p:cSld>
-  <p:clrMapOvr>
-    <a:masterClrMapping/>
-  </p:clrMapOvr>
-</p:sld>
-</file>
-
-<file path=ppt/slides/slide8.xml><?xml version="1.0" encoding="utf-8"?>
-<p:sld xmlns:a="http://schemas.openxmlformats.org/drawingml/2006/main" xmlns:r="http://schemas.openxmlformats.org/officeDocument/2006/relationships" xmlns:p="http://schemas.openxmlformats.org/presentationml/2006/main">
-  <p:cSld>
-    <p:spTree>
-      <p:nvGrpSpPr>
-        <p:cNvPr id="1" name=""/>
-        <p:cNvGrpSpPr/>
-        <p:nvPr/>
-      </p:nvGrpSpPr>
-      <p:grpSpPr>
-        <a:xfrm>
-          <a:off x="0" y="0"/>
-          <a:ext cx="0" cy="0"/>
-          <a:chOff x="0" y="0"/>
-          <a:chExt cx="0" cy="0"/>
-        </a:xfrm>
-      </p:grpSpPr>
-      <p:sp>
-        <p:nvSpPr>
-          <p:cNvPr id="2" name="TextBox 1"/>
-          <p:cNvSpPr txBox="1"/>
-          <p:nvPr/>
-        </p:nvSpPr>
-        <p:spPr>
-          <a:xfrm>
-            <a:off x="0" y="1706940"/>
-            <a:ext cx="9144000" cy="1569660"/>
-          </a:xfrm>
-          <a:prstGeom prst="rect">
-            <a:avLst/>
-          </a:prstGeom>
-          <a:noFill/>
-        </p:spPr>
-        <p:txBody>
-          <a:bodyPr wrap="square" rtlCol="0">
-            <a:spAutoFit/>
-          </a:bodyPr>
-          <a:lstStyle/>
-          <a:p>
-            <a:pPr algn="ctr"/>
-            <a:r>
-              <a:rPr lang="en-US" sz="9600" dirty="0" smtClean="0">
-                <a:latin typeface="Baskervald ADF Std" pitchFamily="18" charset="0"/>
-              </a:rPr>
-              <a:t>Dataset Creation</a:t>
-            </a:r>
-            <a:endParaRPr lang="en-US" sz="8800" dirty="0">
-              <a:latin typeface="Baskervald ADF Std" pitchFamily="18" charset="0"/>
-            </a:endParaRPr>
-          </a:p>
-        </p:txBody>
-      </p:sp>
-    </p:spTree>
-    <p:extLst>
-      <p:ext uri="{BB962C8B-B14F-4D97-AF65-F5344CB8AC3E}">
-        <p14:creationId xmlns:p14="http://schemas.microsoft.com/office/powerpoint/2010/main" val="227577481"/>
       </p:ext>
     </p:extLst>
   </p:cSld>
@@ -8466,7 +8638,7 @@
         <p:spPr>
           <a:xfrm>
             <a:off x="0" y="1706940"/>
-            <a:ext cx="9144000" cy="3046988"/>
+            <a:ext cx="9144000" cy="1569660"/>
           </a:xfrm>
           <a:prstGeom prst="rect">
             <a:avLst/>
@@ -8484,13 +8656,7 @@
               <a:rPr lang="en-US" sz="9600" dirty="0" smtClean="0">
                 <a:latin typeface="Baskervald ADF Std" pitchFamily="18" charset="0"/>
               </a:rPr>
-              <a:t>Real-time</a:t>
-            </a:r>
-            <a:r>
-              <a:rPr lang="en-US" sz="9600" dirty="0" smtClean="0">
-                <a:latin typeface="Baskervald ADF Std" pitchFamily="18" charset="0"/>
-              </a:rPr>
-              <a:t> Pose Recovery</a:t>
+              <a:t>Dataset Creation</a:t>
             </a:r>
             <a:endParaRPr lang="en-US" sz="8800" dirty="0">
               <a:latin typeface="Baskervald ADF Std" pitchFamily="18" charset="0"/>
@@ -8501,7 +8667,7 @@
     </p:spTree>
     <p:extLst>
       <p:ext uri="{BB962C8B-B14F-4D97-AF65-F5344CB8AC3E}">
-        <p14:creationId xmlns:p14="http://schemas.microsoft.com/office/powerpoint/2010/main" val="317150048"/>
+        <p14:creationId xmlns:p14="http://schemas.microsoft.com/office/powerpoint/2010/main" val="227577481"/>
       </p:ext>
     </p:extLst>
   </p:cSld>

</xml_diff>